<commit_message>
smv tg: update smoke drawing notes
Former-commit-id: 75f9a3d7c0a41b515a233c4d244b9663e2833e3d [formerly 2e5797906dc3636ed891aa837c5b569a69379f28]
Former-commit-id: 26a74de913902cc292bfe59c552f2e40af92dac0
Former-commit-id: 50a95972f1834dafd44e48166dbb1931fdb888a5
</commit_message>
<xml_diff>
--- a/Manuals/SMV_Technical_Reference_Guide/figures/figDIRS.pptx
+++ b/Manuals/SMV_Technical_Reference_Guide/figures/figDIRS.pptx
@@ -10,8 +10,8 @@
   <p:sldIdLst>
     <p:sldId id="256" r:id="rId2"/>
     <p:sldId id="257" r:id="rId3"/>
-    <p:sldId id="259" r:id="rId4"/>
-    <p:sldId id="258" r:id="rId5"/>
+    <p:sldId id="258" r:id="rId4"/>
+    <p:sldId id="259" r:id="rId5"/>
     <p:sldId id="260" r:id="rId6"/>
   </p:sldIdLst>
   <p:sldSz cx="9144000" cy="6858000" type="screen4x3"/>
@@ -196,7 +196,7 @@
           <a:p>
             <a:fld id="{65CDB176-27EA-4D7D-A50D-89F02DBB8784}" type="datetimeFigureOut">
               <a:rPr lang="en-US" smtClean="0"/>
-              <a:t>4/28/2011</a:t>
+              <a:t>8/22/2011</a:t>
             </a:fld>
             <a:endParaRPr lang="en-US"/>
           </a:p>
@@ -364,6 +364,11 @@
         </p:txBody>
       </p:sp>
     </p:spTree>
+    <p:extLst>
+      <p:ext uri="{BB962C8B-B14F-4D97-AF65-F5344CB8AC3E}">
+        <p14:creationId xmlns:p14="http://schemas.microsoft.com/office/powerpoint/2010/main" val="942988498"/>
+      </p:ext>
+    </p:extLst>
   </p:cSld>
   <p:clrMap bg1="lt1" tx1="dk1" bg2="lt2" tx2="dk2" accent1="accent1" accent2="accent2" accent3="accent3" accent4="accent4" accent5="accent5" accent6="accent6" hlink="hlink" folHlink="folHlink"/>
   <p:notesStyle>
@@ -1047,7 +1052,7 @@
           <a:p>
             <a:fld id="{9C5038C4-64CF-4B65-A13F-FBF4D7AEA3E7}" type="datetimeFigureOut">
               <a:rPr lang="en-US" smtClean="0"/>
-              <a:t>4/28/2011</a:t>
+              <a:t>8/22/2011</a:t>
             </a:fld>
             <a:endParaRPr lang="en-US"/>
           </a:p>
@@ -1212,7 +1217,7 @@
           <a:p>
             <a:fld id="{9C5038C4-64CF-4B65-A13F-FBF4D7AEA3E7}" type="datetimeFigureOut">
               <a:rPr lang="en-US" smtClean="0"/>
-              <a:t>4/28/2011</a:t>
+              <a:t>8/22/2011</a:t>
             </a:fld>
             <a:endParaRPr lang="en-US"/>
           </a:p>
@@ -1387,7 +1392,7 @@
           <a:p>
             <a:fld id="{9C5038C4-64CF-4B65-A13F-FBF4D7AEA3E7}" type="datetimeFigureOut">
               <a:rPr lang="en-US" smtClean="0"/>
-              <a:t>4/28/2011</a:t>
+              <a:t>8/22/2011</a:t>
             </a:fld>
             <a:endParaRPr lang="en-US"/>
           </a:p>
@@ -1552,7 +1557,7 @@
           <a:p>
             <a:fld id="{9C5038C4-64CF-4B65-A13F-FBF4D7AEA3E7}" type="datetimeFigureOut">
               <a:rPr lang="en-US" smtClean="0"/>
-              <a:t>4/28/2011</a:t>
+              <a:t>8/22/2011</a:t>
             </a:fld>
             <a:endParaRPr lang="en-US"/>
           </a:p>
@@ -1793,7 +1798,7 @@
           <a:p>
             <a:fld id="{9C5038C4-64CF-4B65-A13F-FBF4D7AEA3E7}" type="datetimeFigureOut">
               <a:rPr lang="en-US" smtClean="0"/>
-              <a:t>4/28/2011</a:t>
+              <a:t>8/22/2011</a:t>
             </a:fld>
             <a:endParaRPr lang="en-US"/>
           </a:p>
@@ -2076,7 +2081,7 @@
           <a:p>
             <a:fld id="{9C5038C4-64CF-4B65-A13F-FBF4D7AEA3E7}" type="datetimeFigureOut">
               <a:rPr lang="en-US" smtClean="0"/>
-              <a:t>4/28/2011</a:t>
+              <a:t>8/22/2011</a:t>
             </a:fld>
             <a:endParaRPr lang="en-US"/>
           </a:p>
@@ -2493,7 +2498,7 @@
           <a:p>
             <a:fld id="{9C5038C4-64CF-4B65-A13F-FBF4D7AEA3E7}" type="datetimeFigureOut">
               <a:rPr lang="en-US" smtClean="0"/>
-              <a:t>4/28/2011</a:t>
+              <a:t>8/22/2011</a:t>
             </a:fld>
             <a:endParaRPr lang="en-US"/>
           </a:p>
@@ -2606,7 +2611,7 @@
           <a:p>
             <a:fld id="{9C5038C4-64CF-4B65-A13F-FBF4D7AEA3E7}" type="datetimeFigureOut">
               <a:rPr lang="en-US" smtClean="0"/>
-              <a:t>4/28/2011</a:t>
+              <a:t>8/22/2011</a:t>
             </a:fld>
             <a:endParaRPr lang="en-US"/>
           </a:p>
@@ -2696,7 +2701,7 @@
           <a:p>
             <a:fld id="{9C5038C4-64CF-4B65-A13F-FBF4D7AEA3E7}" type="datetimeFigureOut">
               <a:rPr lang="en-US" smtClean="0"/>
-              <a:t>4/28/2011</a:t>
+              <a:t>8/22/2011</a:t>
             </a:fld>
             <a:endParaRPr lang="en-US"/>
           </a:p>
@@ -2968,7 +2973,7 @@
           <a:p>
             <a:fld id="{9C5038C4-64CF-4B65-A13F-FBF4D7AEA3E7}" type="datetimeFigureOut">
               <a:rPr lang="en-US" smtClean="0"/>
-              <a:t>4/28/2011</a:t>
+              <a:t>8/22/2011</a:t>
             </a:fld>
             <a:endParaRPr lang="en-US"/>
           </a:p>
@@ -3216,7 +3221,7 @@
           <a:p>
             <a:fld id="{9C5038C4-64CF-4B65-A13F-FBF4D7AEA3E7}" type="datetimeFigureOut">
               <a:rPr lang="en-US" smtClean="0"/>
-              <a:t>4/28/2011</a:t>
+              <a:t>8/22/2011</a:t>
             </a:fld>
             <a:endParaRPr lang="en-US"/>
           </a:p>
@@ -3424,7 +3429,7 @@
           <a:p>
             <a:fld id="{9C5038C4-64CF-4B65-A13F-FBF4D7AEA3E7}" type="datetimeFigureOut">
               <a:rPr lang="en-US" smtClean="0"/>
-              <a:t>4/28/2011</a:t>
+              <a:t>8/22/2011</a:t>
             </a:fld>
             <a:endParaRPr lang="en-US"/>
           </a:p>
@@ -5434,6 +5439,13 @@
   <p:clrMapOvr>
     <a:masterClrMapping/>
   </p:clrMapOvr>
+  <p:timing>
+    <p:tnLst>
+      <p:par>
+        <p:cTn id="1" dur="indefinite" restart="never" nodeType="tmRoot"/>
+      </p:par>
+    </p:tnLst>
+  </p:timing>
 </p:sld>
 </file>
 
@@ -7264,15 +7276,1924 @@
           </a:fontRef>
         </p:style>
       </p:cxnSp>
+      <p:sp>
+        <p:nvSpPr>
+          <p:cNvPr id="44" name="TextBox 43"/>
+          <p:cNvSpPr txBox="1"/>
+          <p:nvPr/>
+        </p:nvSpPr>
+        <p:spPr>
+          <a:xfrm>
+            <a:off x="6174973" y="1270181"/>
+            <a:ext cx="1978427" cy="369332"/>
+          </a:xfrm>
+          <a:prstGeom prst="rect">
+            <a:avLst/>
+          </a:prstGeom>
+          <a:noFill/>
+        </p:spPr>
+        <p:txBody>
+          <a:bodyPr wrap="none" rtlCol="0">
+            <a:spAutoFit/>
+          </a:bodyPr>
+          <a:lstStyle/>
+          <a:p>
+            <a:r>
+              <a:rPr lang="en-US" dirty="0" smtClean="0"/>
+              <a:t>.875 2.625 .75 4.25</a:t>
+            </a:r>
+            <a:endParaRPr lang="en-US" dirty="0"/>
+          </a:p>
+        </p:txBody>
+      </p:sp>
     </p:spTree>
   </p:cSld>
   <p:clrMapOvr>
     <a:masterClrMapping/>
   </p:clrMapOvr>
+  <p:timing>
+    <p:tnLst>
+      <p:par>
+        <p:cTn id="1" dur="indefinite" restart="never" nodeType="tmRoot"/>
+      </p:par>
+    </p:tnLst>
+  </p:timing>
 </p:sld>
 </file>
 
 <file path=ppt/slides/slide3.xml><?xml version="1.0" encoding="utf-8"?>
+<p:sld xmlns:a="http://schemas.openxmlformats.org/drawingml/2006/main" xmlns:r="http://schemas.openxmlformats.org/officeDocument/2006/relationships" xmlns:p="http://schemas.openxmlformats.org/presentationml/2006/main">
+  <p:cSld>
+    <p:spTree>
+      <p:nvGrpSpPr>
+        <p:cNvPr id="1" name=""/>
+        <p:cNvGrpSpPr/>
+        <p:nvPr/>
+      </p:nvGrpSpPr>
+      <p:grpSpPr>
+        <a:xfrm>
+          <a:off x="0" y="0"/>
+          <a:ext cx="0" cy="0"/>
+          <a:chOff x="0" y="0"/>
+          <a:chExt cx="0" cy="0"/>
+        </a:xfrm>
+      </p:grpSpPr>
+      <p:grpSp>
+        <p:nvGrpSpPr>
+          <p:cNvPr id="2" name="Group 3"/>
+          <p:cNvGrpSpPr/>
+          <p:nvPr/>
+        </p:nvGrpSpPr>
+        <p:grpSpPr>
+          <a:xfrm rot="825045">
+            <a:off x="914400" y="914400"/>
+            <a:ext cx="2834640" cy="2834640"/>
+            <a:chOff x="914400" y="914400"/>
+            <a:chExt cx="2834640" cy="2834640"/>
+          </a:xfrm>
+        </p:grpSpPr>
+        <p:sp>
+          <p:nvSpPr>
+            <p:cNvPr id="5" name="Oval 4"/>
+            <p:cNvSpPr>
+              <a:spLocks/>
+            </p:cNvSpPr>
+            <p:nvPr/>
+          </p:nvSpPr>
+          <p:spPr>
+            <a:xfrm>
+              <a:off x="914400" y="914400"/>
+              <a:ext cx="91440" cy="91440"/>
+            </a:xfrm>
+            <a:prstGeom prst="ellipse">
+              <a:avLst/>
+            </a:prstGeom>
+            <a:solidFill>
+              <a:schemeClr val="tx1"/>
+            </a:solidFill>
+          </p:spPr>
+          <p:style>
+            <a:lnRef idx="2">
+              <a:schemeClr val="accent1">
+                <a:shade val="50000"/>
+              </a:schemeClr>
+            </a:lnRef>
+            <a:fillRef idx="1">
+              <a:schemeClr val="accent1"/>
+            </a:fillRef>
+            <a:effectRef idx="0">
+              <a:schemeClr val="accent1"/>
+            </a:effectRef>
+            <a:fontRef idx="minor">
+              <a:schemeClr val="lt1"/>
+            </a:fontRef>
+          </p:style>
+          <p:txBody>
+            <a:bodyPr rtlCol="0" anchor="ctr"/>
+            <a:lstStyle/>
+            <a:p>
+              <a:pPr algn="ctr"/>
+              <a:endParaRPr lang="en-US"/>
+            </a:p>
+          </p:txBody>
+        </p:sp>
+        <p:sp>
+          <p:nvSpPr>
+            <p:cNvPr id="6" name="Oval 5"/>
+            <p:cNvSpPr>
+              <a:spLocks/>
+            </p:cNvSpPr>
+            <p:nvPr/>
+          </p:nvSpPr>
+          <p:spPr>
+            <a:xfrm>
+              <a:off x="1463040" y="914400"/>
+              <a:ext cx="91440" cy="91440"/>
+            </a:xfrm>
+            <a:prstGeom prst="ellipse">
+              <a:avLst/>
+            </a:prstGeom>
+            <a:solidFill>
+              <a:schemeClr val="tx1"/>
+            </a:solidFill>
+          </p:spPr>
+          <p:style>
+            <a:lnRef idx="2">
+              <a:schemeClr val="accent1">
+                <a:shade val="50000"/>
+              </a:schemeClr>
+            </a:lnRef>
+            <a:fillRef idx="1">
+              <a:schemeClr val="accent1"/>
+            </a:fillRef>
+            <a:effectRef idx="0">
+              <a:schemeClr val="accent1"/>
+            </a:effectRef>
+            <a:fontRef idx="minor">
+              <a:schemeClr val="lt1"/>
+            </a:fontRef>
+          </p:style>
+          <p:txBody>
+            <a:bodyPr rtlCol="0" anchor="ctr"/>
+            <a:lstStyle/>
+            <a:p>
+              <a:pPr algn="ctr"/>
+              <a:endParaRPr lang="en-US"/>
+            </a:p>
+          </p:txBody>
+        </p:sp>
+        <p:sp>
+          <p:nvSpPr>
+            <p:cNvPr id="7" name="Oval 6"/>
+            <p:cNvSpPr>
+              <a:spLocks/>
+            </p:cNvSpPr>
+            <p:nvPr/>
+          </p:nvSpPr>
+          <p:spPr>
+            <a:xfrm>
+              <a:off x="2011680" y="914400"/>
+              <a:ext cx="91440" cy="91440"/>
+            </a:xfrm>
+            <a:prstGeom prst="ellipse">
+              <a:avLst/>
+            </a:prstGeom>
+            <a:solidFill>
+              <a:schemeClr val="tx1"/>
+            </a:solidFill>
+          </p:spPr>
+          <p:style>
+            <a:lnRef idx="2">
+              <a:schemeClr val="accent1">
+                <a:shade val="50000"/>
+              </a:schemeClr>
+            </a:lnRef>
+            <a:fillRef idx="1">
+              <a:schemeClr val="accent1"/>
+            </a:fillRef>
+            <a:effectRef idx="0">
+              <a:schemeClr val="accent1"/>
+            </a:effectRef>
+            <a:fontRef idx="minor">
+              <a:schemeClr val="lt1"/>
+            </a:fontRef>
+          </p:style>
+          <p:txBody>
+            <a:bodyPr rtlCol="0" anchor="ctr"/>
+            <a:lstStyle/>
+            <a:p>
+              <a:pPr algn="ctr"/>
+              <a:endParaRPr lang="en-US"/>
+            </a:p>
+          </p:txBody>
+        </p:sp>
+        <p:sp>
+          <p:nvSpPr>
+            <p:cNvPr id="8" name="Oval 7"/>
+            <p:cNvSpPr>
+              <a:spLocks/>
+            </p:cNvSpPr>
+            <p:nvPr/>
+          </p:nvSpPr>
+          <p:spPr>
+            <a:xfrm>
+              <a:off x="2560320" y="914400"/>
+              <a:ext cx="91440" cy="91440"/>
+            </a:xfrm>
+            <a:prstGeom prst="ellipse">
+              <a:avLst/>
+            </a:prstGeom>
+            <a:solidFill>
+              <a:schemeClr val="tx1"/>
+            </a:solidFill>
+          </p:spPr>
+          <p:style>
+            <a:lnRef idx="2">
+              <a:schemeClr val="accent1">
+                <a:shade val="50000"/>
+              </a:schemeClr>
+            </a:lnRef>
+            <a:fillRef idx="1">
+              <a:schemeClr val="accent1"/>
+            </a:fillRef>
+            <a:effectRef idx="0">
+              <a:schemeClr val="accent1"/>
+            </a:effectRef>
+            <a:fontRef idx="minor">
+              <a:schemeClr val="lt1"/>
+            </a:fontRef>
+          </p:style>
+          <p:txBody>
+            <a:bodyPr rtlCol="0" anchor="ctr"/>
+            <a:lstStyle/>
+            <a:p>
+              <a:pPr algn="ctr"/>
+              <a:endParaRPr lang="en-US"/>
+            </a:p>
+          </p:txBody>
+        </p:sp>
+        <p:sp>
+          <p:nvSpPr>
+            <p:cNvPr id="9" name="Oval 8"/>
+            <p:cNvSpPr>
+              <a:spLocks/>
+            </p:cNvSpPr>
+            <p:nvPr/>
+          </p:nvSpPr>
+          <p:spPr>
+            <a:xfrm>
+              <a:off x="3108960" y="914400"/>
+              <a:ext cx="91440" cy="91440"/>
+            </a:xfrm>
+            <a:prstGeom prst="ellipse">
+              <a:avLst/>
+            </a:prstGeom>
+            <a:solidFill>
+              <a:schemeClr val="tx1"/>
+            </a:solidFill>
+          </p:spPr>
+          <p:style>
+            <a:lnRef idx="2">
+              <a:schemeClr val="accent1">
+                <a:shade val="50000"/>
+              </a:schemeClr>
+            </a:lnRef>
+            <a:fillRef idx="1">
+              <a:schemeClr val="accent1"/>
+            </a:fillRef>
+            <a:effectRef idx="0">
+              <a:schemeClr val="accent1"/>
+            </a:effectRef>
+            <a:fontRef idx="minor">
+              <a:schemeClr val="lt1"/>
+            </a:fontRef>
+          </p:style>
+          <p:txBody>
+            <a:bodyPr rtlCol="0" anchor="ctr"/>
+            <a:lstStyle/>
+            <a:p>
+              <a:pPr algn="ctr"/>
+              <a:endParaRPr lang="en-US"/>
+            </a:p>
+          </p:txBody>
+        </p:sp>
+        <p:sp>
+          <p:nvSpPr>
+            <p:cNvPr id="10" name="Oval 9"/>
+            <p:cNvSpPr>
+              <a:spLocks/>
+            </p:cNvSpPr>
+            <p:nvPr/>
+          </p:nvSpPr>
+          <p:spPr>
+            <a:xfrm>
+              <a:off x="3657600" y="914400"/>
+              <a:ext cx="91440" cy="91440"/>
+            </a:xfrm>
+            <a:prstGeom prst="ellipse">
+              <a:avLst/>
+            </a:prstGeom>
+            <a:solidFill>
+              <a:schemeClr val="tx1"/>
+            </a:solidFill>
+          </p:spPr>
+          <p:style>
+            <a:lnRef idx="2">
+              <a:schemeClr val="accent1">
+                <a:shade val="50000"/>
+              </a:schemeClr>
+            </a:lnRef>
+            <a:fillRef idx="1">
+              <a:schemeClr val="accent1"/>
+            </a:fillRef>
+            <a:effectRef idx="0">
+              <a:schemeClr val="accent1"/>
+            </a:effectRef>
+            <a:fontRef idx="minor">
+              <a:schemeClr val="lt1"/>
+            </a:fontRef>
+          </p:style>
+          <p:txBody>
+            <a:bodyPr rtlCol="0" anchor="ctr"/>
+            <a:lstStyle/>
+            <a:p>
+              <a:pPr algn="ctr"/>
+              <a:endParaRPr lang="en-US"/>
+            </a:p>
+          </p:txBody>
+        </p:sp>
+        <p:sp>
+          <p:nvSpPr>
+            <p:cNvPr id="11" name="Oval 10"/>
+            <p:cNvSpPr>
+              <a:spLocks/>
+            </p:cNvSpPr>
+            <p:nvPr/>
+          </p:nvSpPr>
+          <p:spPr>
+            <a:xfrm>
+              <a:off x="914400" y="1463040"/>
+              <a:ext cx="91440" cy="91440"/>
+            </a:xfrm>
+            <a:prstGeom prst="ellipse">
+              <a:avLst/>
+            </a:prstGeom>
+            <a:solidFill>
+              <a:schemeClr val="tx1"/>
+            </a:solidFill>
+          </p:spPr>
+          <p:style>
+            <a:lnRef idx="2">
+              <a:schemeClr val="accent1">
+                <a:shade val="50000"/>
+              </a:schemeClr>
+            </a:lnRef>
+            <a:fillRef idx="1">
+              <a:schemeClr val="accent1"/>
+            </a:fillRef>
+            <a:effectRef idx="0">
+              <a:schemeClr val="accent1"/>
+            </a:effectRef>
+            <a:fontRef idx="minor">
+              <a:schemeClr val="lt1"/>
+            </a:fontRef>
+          </p:style>
+          <p:txBody>
+            <a:bodyPr rtlCol="0" anchor="ctr"/>
+            <a:lstStyle/>
+            <a:p>
+              <a:pPr algn="ctr"/>
+              <a:endParaRPr lang="en-US"/>
+            </a:p>
+          </p:txBody>
+        </p:sp>
+        <p:sp>
+          <p:nvSpPr>
+            <p:cNvPr id="12" name="Oval 11"/>
+            <p:cNvSpPr>
+              <a:spLocks/>
+            </p:cNvSpPr>
+            <p:nvPr/>
+          </p:nvSpPr>
+          <p:spPr>
+            <a:xfrm>
+              <a:off x="1463040" y="1463040"/>
+              <a:ext cx="91440" cy="91440"/>
+            </a:xfrm>
+            <a:prstGeom prst="ellipse">
+              <a:avLst/>
+            </a:prstGeom>
+            <a:solidFill>
+              <a:schemeClr val="tx1"/>
+            </a:solidFill>
+          </p:spPr>
+          <p:style>
+            <a:lnRef idx="2">
+              <a:schemeClr val="accent1">
+                <a:shade val="50000"/>
+              </a:schemeClr>
+            </a:lnRef>
+            <a:fillRef idx="1">
+              <a:schemeClr val="accent1"/>
+            </a:fillRef>
+            <a:effectRef idx="0">
+              <a:schemeClr val="accent1"/>
+            </a:effectRef>
+            <a:fontRef idx="minor">
+              <a:schemeClr val="lt1"/>
+            </a:fontRef>
+          </p:style>
+          <p:txBody>
+            <a:bodyPr rtlCol="0" anchor="ctr"/>
+            <a:lstStyle/>
+            <a:p>
+              <a:pPr algn="ctr"/>
+              <a:endParaRPr lang="en-US"/>
+            </a:p>
+          </p:txBody>
+        </p:sp>
+        <p:sp>
+          <p:nvSpPr>
+            <p:cNvPr id="13" name="Oval 12"/>
+            <p:cNvSpPr>
+              <a:spLocks/>
+            </p:cNvSpPr>
+            <p:nvPr/>
+          </p:nvSpPr>
+          <p:spPr>
+            <a:xfrm>
+              <a:off x="2011680" y="1463040"/>
+              <a:ext cx="91440" cy="91440"/>
+            </a:xfrm>
+            <a:prstGeom prst="ellipse">
+              <a:avLst/>
+            </a:prstGeom>
+            <a:solidFill>
+              <a:schemeClr val="tx1"/>
+            </a:solidFill>
+          </p:spPr>
+          <p:style>
+            <a:lnRef idx="2">
+              <a:schemeClr val="accent1">
+                <a:shade val="50000"/>
+              </a:schemeClr>
+            </a:lnRef>
+            <a:fillRef idx="1">
+              <a:schemeClr val="accent1"/>
+            </a:fillRef>
+            <a:effectRef idx="0">
+              <a:schemeClr val="accent1"/>
+            </a:effectRef>
+            <a:fontRef idx="minor">
+              <a:schemeClr val="lt1"/>
+            </a:fontRef>
+          </p:style>
+          <p:txBody>
+            <a:bodyPr rtlCol="0" anchor="ctr"/>
+            <a:lstStyle/>
+            <a:p>
+              <a:pPr algn="ctr"/>
+              <a:endParaRPr lang="en-US"/>
+            </a:p>
+          </p:txBody>
+        </p:sp>
+        <p:sp>
+          <p:nvSpPr>
+            <p:cNvPr id="14" name="Oval 13"/>
+            <p:cNvSpPr>
+              <a:spLocks/>
+            </p:cNvSpPr>
+            <p:nvPr/>
+          </p:nvSpPr>
+          <p:spPr>
+            <a:xfrm>
+              <a:off x="2560320" y="1463040"/>
+              <a:ext cx="91440" cy="91440"/>
+            </a:xfrm>
+            <a:prstGeom prst="ellipse">
+              <a:avLst/>
+            </a:prstGeom>
+            <a:solidFill>
+              <a:schemeClr val="tx1"/>
+            </a:solidFill>
+          </p:spPr>
+          <p:style>
+            <a:lnRef idx="2">
+              <a:schemeClr val="accent1">
+                <a:shade val="50000"/>
+              </a:schemeClr>
+            </a:lnRef>
+            <a:fillRef idx="1">
+              <a:schemeClr val="accent1"/>
+            </a:fillRef>
+            <a:effectRef idx="0">
+              <a:schemeClr val="accent1"/>
+            </a:effectRef>
+            <a:fontRef idx="minor">
+              <a:schemeClr val="lt1"/>
+            </a:fontRef>
+          </p:style>
+          <p:txBody>
+            <a:bodyPr rtlCol="0" anchor="ctr"/>
+            <a:lstStyle/>
+            <a:p>
+              <a:pPr algn="ctr"/>
+              <a:endParaRPr lang="en-US"/>
+            </a:p>
+          </p:txBody>
+        </p:sp>
+        <p:sp>
+          <p:nvSpPr>
+            <p:cNvPr id="15" name="Oval 14"/>
+            <p:cNvSpPr>
+              <a:spLocks/>
+            </p:cNvSpPr>
+            <p:nvPr/>
+          </p:nvSpPr>
+          <p:spPr>
+            <a:xfrm>
+              <a:off x="3108960" y="1463040"/>
+              <a:ext cx="91440" cy="91440"/>
+            </a:xfrm>
+            <a:prstGeom prst="ellipse">
+              <a:avLst/>
+            </a:prstGeom>
+            <a:solidFill>
+              <a:schemeClr val="tx1"/>
+            </a:solidFill>
+          </p:spPr>
+          <p:style>
+            <a:lnRef idx="2">
+              <a:schemeClr val="accent1">
+                <a:shade val="50000"/>
+              </a:schemeClr>
+            </a:lnRef>
+            <a:fillRef idx="1">
+              <a:schemeClr val="accent1"/>
+            </a:fillRef>
+            <a:effectRef idx="0">
+              <a:schemeClr val="accent1"/>
+            </a:effectRef>
+            <a:fontRef idx="minor">
+              <a:schemeClr val="lt1"/>
+            </a:fontRef>
+          </p:style>
+          <p:txBody>
+            <a:bodyPr rtlCol="0" anchor="ctr"/>
+            <a:lstStyle/>
+            <a:p>
+              <a:pPr algn="ctr"/>
+              <a:endParaRPr lang="en-US"/>
+            </a:p>
+          </p:txBody>
+        </p:sp>
+        <p:sp>
+          <p:nvSpPr>
+            <p:cNvPr id="16" name="Oval 15"/>
+            <p:cNvSpPr>
+              <a:spLocks/>
+            </p:cNvSpPr>
+            <p:nvPr/>
+          </p:nvSpPr>
+          <p:spPr>
+            <a:xfrm>
+              <a:off x="3657600" y="1463040"/>
+              <a:ext cx="91440" cy="91440"/>
+            </a:xfrm>
+            <a:prstGeom prst="ellipse">
+              <a:avLst/>
+            </a:prstGeom>
+            <a:solidFill>
+              <a:schemeClr val="tx1"/>
+            </a:solidFill>
+          </p:spPr>
+          <p:style>
+            <a:lnRef idx="2">
+              <a:schemeClr val="accent1">
+                <a:shade val="50000"/>
+              </a:schemeClr>
+            </a:lnRef>
+            <a:fillRef idx="1">
+              <a:schemeClr val="accent1"/>
+            </a:fillRef>
+            <a:effectRef idx="0">
+              <a:schemeClr val="accent1"/>
+            </a:effectRef>
+            <a:fontRef idx="minor">
+              <a:schemeClr val="lt1"/>
+            </a:fontRef>
+          </p:style>
+          <p:txBody>
+            <a:bodyPr rtlCol="0" anchor="ctr"/>
+            <a:lstStyle/>
+            <a:p>
+              <a:pPr algn="ctr"/>
+              <a:endParaRPr lang="en-US"/>
+            </a:p>
+          </p:txBody>
+        </p:sp>
+        <p:sp>
+          <p:nvSpPr>
+            <p:cNvPr id="17" name="Oval 16"/>
+            <p:cNvSpPr>
+              <a:spLocks/>
+            </p:cNvSpPr>
+            <p:nvPr/>
+          </p:nvSpPr>
+          <p:spPr>
+            <a:xfrm>
+              <a:off x="914400" y="2011680"/>
+              <a:ext cx="91440" cy="91440"/>
+            </a:xfrm>
+            <a:prstGeom prst="ellipse">
+              <a:avLst/>
+            </a:prstGeom>
+            <a:solidFill>
+              <a:schemeClr val="tx1"/>
+            </a:solidFill>
+          </p:spPr>
+          <p:style>
+            <a:lnRef idx="2">
+              <a:schemeClr val="accent1">
+                <a:shade val="50000"/>
+              </a:schemeClr>
+            </a:lnRef>
+            <a:fillRef idx="1">
+              <a:schemeClr val="accent1"/>
+            </a:fillRef>
+            <a:effectRef idx="0">
+              <a:schemeClr val="accent1"/>
+            </a:effectRef>
+            <a:fontRef idx="minor">
+              <a:schemeClr val="lt1"/>
+            </a:fontRef>
+          </p:style>
+          <p:txBody>
+            <a:bodyPr rtlCol="0" anchor="ctr"/>
+            <a:lstStyle/>
+            <a:p>
+              <a:pPr algn="ctr"/>
+              <a:endParaRPr lang="en-US"/>
+            </a:p>
+          </p:txBody>
+        </p:sp>
+        <p:sp>
+          <p:nvSpPr>
+            <p:cNvPr id="18" name="Oval 17"/>
+            <p:cNvSpPr>
+              <a:spLocks/>
+            </p:cNvSpPr>
+            <p:nvPr/>
+          </p:nvSpPr>
+          <p:spPr>
+            <a:xfrm>
+              <a:off x="1463040" y="2011680"/>
+              <a:ext cx="91440" cy="91440"/>
+            </a:xfrm>
+            <a:prstGeom prst="ellipse">
+              <a:avLst/>
+            </a:prstGeom>
+            <a:solidFill>
+              <a:schemeClr val="tx1"/>
+            </a:solidFill>
+          </p:spPr>
+          <p:style>
+            <a:lnRef idx="2">
+              <a:schemeClr val="accent1">
+                <a:shade val="50000"/>
+              </a:schemeClr>
+            </a:lnRef>
+            <a:fillRef idx="1">
+              <a:schemeClr val="accent1"/>
+            </a:fillRef>
+            <a:effectRef idx="0">
+              <a:schemeClr val="accent1"/>
+            </a:effectRef>
+            <a:fontRef idx="minor">
+              <a:schemeClr val="lt1"/>
+            </a:fontRef>
+          </p:style>
+          <p:txBody>
+            <a:bodyPr rtlCol="0" anchor="ctr"/>
+            <a:lstStyle/>
+            <a:p>
+              <a:pPr algn="ctr"/>
+              <a:endParaRPr lang="en-US"/>
+            </a:p>
+          </p:txBody>
+        </p:sp>
+        <p:sp>
+          <p:nvSpPr>
+            <p:cNvPr id="19" name="Oval 18"/>
+            <p:cNvSpPr>
+              <a:spLocks/>
+            </p:cNvSpPr>
+            <p:nvPr/>
+          </p:nvSpPr>
+          <p:spPr>
+            <a:xfrm>
+              <a:off x="2011680" y="2011680"/>
+              <a:ext cx="91440" cy="91440"/>
+            </a:xfrm>
+            <a:prstGeom prst="ellipse">
+              <a:avLst/>
+            </a:prstGeom>
+            <a:solidFill>
+              <a:schemeClr val="tx1"/>
+            </a:solidFill>
+          </p:spPr>
+          <p:style>
+            <a:lnRef idx="2">
+              <a:schemeClr val="accent1">
+                <a:shade val="50000"/>
+              </a:schemeClr>
+            </a:lnRef>
+            <a:fillRef idx="1">
+              <a:schemeClr val="accent1"/>
+            </a:fillRef>
+            <a:effectRef idx="0">
+              <a:schemeClr val="accent1"/>
+            </a:effectRef>
+            <a:fontRef idx="minor">
+              <a:schemeClr val="lt1"/>
+            </a:fontRef>
+          </p:style>
+          <p:txBody>
+            <a:bodyPr rtlCol="0" anchor="ctr"/>
+            <a:lstStyle/>
+            <a:p>
+              <a:pPr algn="ctr"/>
+              <a:endParaRPr lang="en-US"/>
+            </a:p>
+          </p:txBody>
+        </p:sp>
+        <p:sp>
+          <p:nvSpPr>
+            <p:cNvPr id="20" name="Oval 19"/>
+            <p:cNvSpPr>
+              <a:spLocks/>
+            </p:cNvSpPr>
+            <p:nvPr/>
+          </p:nvSpPr>
+          <p:spPr>
+            <a:xfrm>
+              <a:off x="2560320" y="2011680"/>
+              <a:ext cx="91440" cy="91440"/>
+            </a:xfrm>
+            <a:prstGeom prst="ellipse">
+              <a:avLst/>
+            </a:prstGeom>
+            <a:solidFill>
+              <a:schemeClr val="tx1"/>
+            </a:solidFill>
+          </p:spPr>
+          <p:style>
+            <a:lnRef idx="2">
+              <a:schemeClr val="accent1">
+                <a:shade val="50000"/>
+              </a:schemeClr>
+            </a:lnRef>
+            <a:fillRef idx="1">
+              <a:schemeClr val="accent1"/>
+            </a:fillRef>
+            <a:effectRef idx="0">
+              <a:schemeClr val="accent1"/>
+            </a:effectRef>
+            <a:fontRef idx="minor">
+              <a:schemeClr val="lt1"/>
+            </a:fontRef>
+          </p:style>
+          <p:txBody>
+            <a:bodyPr rtlCol="0" anchor="ctr"/>
+            <a:lstStyle/>
+            <a:p>
+              <a:pPr algn="ctr"/>
+              <a:endParaRPr lang="en-US"/>
+            </a:p>
+          </p:txBody>
+        </p:sp>
+        <p:sp>
+          <p:nvSpPr>
+            <p:cNvPr id="21" name="Oval 20"/>
+            <p:cNvSpPr>
+              <a:spLocks/>
+            </p:cNvSpPr>
+            <p:nvPr/>
+          </p:nvSpPr>
+          <p:spPr>
+            <a:xfrm>
+              <a:off x="3108960" y="2011680"/>
+              <a:ext cx="91440" cy="91440"/>
+            </a:xfrm>
+            <a:prstGeom prst="ellipse">
+              <a:avLst/>
+            </a:prstGeom>
+            <a:solidFill>
+              <a:schemeClr val="tx1"/>
+            </a:solidFill>
+          </p:spPr>
+          <p:style>
+            <a:lnRef idx="2">
+              <a:schemeClr val="accent1">
+                <a:shade val="50000"/>
+              </a:schemeClr>
+            </a:lnRef>
+            <a:fillRef idx="1">
+              <a:schemeClr val="accent1"/>
+            </a:fillRef>
+            <a:effectRef idx="0">
+              <a:schemeClr val="accent1"/>
+            </a:effectRef>
+            <a:fontRef idx="minor">
+              <a:schemeClr val="lt1"/>
+            </a:fontRef>
+          </p:style>
+          <p:txBody>
+            <a:bodyPr rtlCol="0" anchor="ctr"/>
+            <a:lstStyle/>
+            <a:p>
+              <a:pPr algn="ctr"/>
+              <a:endParaRPr lang="en-US"/>
+            </a:p>
+          </p:txBody>
+        </p:sp>
+        <p:sp>
+          <p:nvSpPr>
+            <p:cNvPr id="22" name="Oval 21"/>
+            <p:cNvSpPr>
+              <a:spLocks/>
+            </p:cNvSpPr>
+            <p:nvPr/>
+          </p:nvSpPr>
+          <p:spPr>
+            <a:xfrm>
+              <a:off x="3657600" y="2011680"/>
+              <a:ext cx="91440" cy="91440"/>
+            </a:xfrm>
+            <a:prstGeom prst="ellipse">
+              <a:avLst/>
+            </a:prstGeom>
+            <a:solidFill>
+              <a:schemeClr val="tx1"/>
+            </a:solidFill>
+          </p:spPr>
+          <p:style>
+            <a:lnRef idx="2">
+              <a:schemeClr val="accent1">
+                <a:shade val="50000"/>
+              </a:schemeClr>
+            </a:lnRef>
+            <a:fillRef idx="1">
+              <a:schemeClr val="accent1"/>
+            </a:fillRef>
+            <a:effectRef idx="0">
+              <a:schemeClr val="accent1"/>
+            </a:effectRef>
+            <a:fontRef idx="minor">
+              <a:schemeClr val="lt1"/>
+            </a:fontRef>
+          </p:style>
+          <p:txBody>
+            <a:bodyPr rtlCol="0" anchor="ctr"/>
+            <a:lstStyle/>
+            <a:p>
+              <a:pPr algn="ctr"/>
+              <a:endParaRPr lang="en-US"/>
+            </a:p>
+          </p:txBody>
+        </p:sp>
+        <p:sp>
+          <p:nvSpPr>
+            <p:cNvPr id="23" name="Oval 22"/>
+            <p:cNvSpPr>
+              <a:spLocks/>
+            </p:cNvSpPr>
+            <p:nvPr/>
+          </p:nvSpPr>
+          <p:spPr>
+            <a:xfrm>
+              <a:off x="914400" y="2560320"/>
+              <a:ext cx="91440" cy="91440"/>
+            </a:xfrm>
+            <a:prstGeom prst="ellipse">
+              <a:avLst/>
+            </a:prstGeom>
+            <a:solidFill>
+              <a:schemeClr val="tx1"/>
+            </a:solidFill>
+          </p:spPr>
+          <p:style>
+            <a:lnRef idx="2">
+              <a:schemeClr val="accent1">
+                <a:shade val="50000"/>
+              </a:schemeClr>
+            </a:lnRef>
+            <a:fillRef idx="1">
+              <a:schemeClr val="accent1"/>
+            </a:fillRef>
+            <a:effectRef idx="0">
+              <a:schemeClr val="accent1"/>
+            </a:effectRef>
+            <a:fontRef idx="minor">
+              <a:schemeClr val="lt1"/>
+            </a:fontRef>
+          </p:style>
+          <p:txBody>
+            <a:bodyPr rtlCol="0" anchor="ctr"/>
+            <a:lstStyle/>
+            <a:p>
+              <a:pPr algn="ctr"/>
+              <a:endParaRPr lang="en-US"/>
+            </a:p>
+          </p:txBody>
+        </p:sp>
+        <p:sp>
+          <p:nvSpPr>
+            <p:cNvPr id="24" name="Oval 23"/>
+            <p:cNvSpPr>
+              <a:spLocks/>
+            </p:cNvSpPr>
+            <p:nvPr/>
+          </p:nvSpPr>
+          <p:spPr>
+            <a:xfrm>
+              <a:off x="1463040" y="2560320"/>
+              <a:ext cx="91440" cy="91440"/>
+            </a:xfrm>
+            <a:prstGeom prst="ellipse">
+              <a:avLst/>
+            </a:prstGeom>
+            <a:solidFill>
+              <a:schemeClr val="tx1"/>
+            </a:solidFill>
+          </p:spPr>
+          <p:style>
+            <a:lnRef idx="2">
+              <a:schemeClr val="accent1">
+                <a:shade val="50000"/>
+              </a:schemeClr>
+            </a:lnRef>
+            <a:fillRef idx="1">
+              <a:schemeClr val="accent1"/>
+            </a:fillRef>
+            <a:effectRef idx="0">
+              <a:schemeClr val="accent1"/>
+            </a:effectRef>
+            <a:fontRef idx="minor">
+              <a:schemeClr val="lt1"/>
+            </a:fontRef>
+          </p:style>
+          <p:txBody>
+            <a:bodyPr rtlCol="0" anchor="ctr"/>
+            <a:lstStyle/>
+            <a:p>
+              <a:pPr algn="ctr"/>
+              <a:endParaRPr lang="en-US"/>
+            </a:p>
+          </p:txBody>
+        </p:sp>
+        <p:sp>
+          <p:nvSpPr>
+            <p:cNvPr id="25" name="Oval 24"/>
+            <p:cNvSpPr>
+              <a:spLocks/>
+            </p:cNvSpPr>
+            <p:nvPr/>
+          </p:nvSpPr>
+          <p:spPr>
+            <a:xfrm>
+              <a:off x="2011680" y="2560320"/>
+              <a:ext cx="91440" cy="91440"/>
+            </a:xfrm>
+            <a:prstGeom prst="ellipse">
+              <a:avLst/>
+            </a:prstGeom>
+            <a:solidFill>
+              <a:schemeClr val="tx1"/>
+            </a:solidFill>
+          </p:spPr>
+          <p:style>
+            <a:lnRef idx="2">
+              <a:schemeClr val="accent1">
+                <a:shade val="50000"/>
+              </a:schemeClr>
+            </a:lnRef>
+            <a:fillRef idx="1">
+              <a:schemeClr val="accent1"/>
+            </a:fillRef>
+            <a:effectRef idx="0">
+              <a:schemeClr val="accent1"/>
+            </a:effectRef>
+            <a:fontRef idx="minor">
+              <a:schemeClr val="lt1"/>
+            </a:fontRef>
+          </p:style>
+          <p:txBody>
+            <a:bodyPr rtlCol="0" anchor="ctr"/>
+            <a:lstStyle/>
+            <a:p>
+              <a:pPr algn="ctr"/>
+              <a:endParaRPr lang="en-US"/>
+            </a:p>
+          </p:txBody>
+        </p:sp>
+        <p:sp>
+          <p:nvSpPr>
+            <p:cNvPr id="26" name="Oval 25"/>
+            <p:cNvSpPr>
+              <a:spLocks/>
+            </p:cNvSpPr>
+            <p:nvPr/>
+          </p:nvSpPr>
+          <p:spPr>
+            <a:xfrm>
+              <a:off x="2560320" y="2560320"/>
+              <a:ext cx="91440" cy="91440"/>
+            </a:xfrm>
+            <a:prstGeom prst="ellipse">
+              <a:avLst/>
+            </a:prstGeom>
+            <a:solidFill>
+              <a:schemeClr val="tx1"/>
+            </a:solidFill>
+          </p:spPr>
+          <p:style>
+            <a:lnRef idx="2">
+              <a:schemeClr val="accent1">
+                <a:shade val="50000"/>
+              </a:schemeClr>
+            </a:lnRef>
+            <a:fillRef idx="1">
+              <a:schemeClr val="accent1"/>
+            </a:fillRef>
+            <a:effectRef idx="0">
+              <a:schemeClr val="accent1"/>
+            </a:effectRef>
+            <a:fontRef idx="minor">
+              <a:schemeClr val="lt1"/>
+            </a:fontRef>
+          </p:style>
+          <p:txBody>
+            <a:bodyPr rtlCol="0" anchor="ctr"/>
+            <a:lstStyle/>
+            <a:p>
+              <a:pPr algn="ctr"/>
+              <a:endParaRPr lang="en-US"/>
+            </a:p>
+          </p:txBody>
+        </p:sp>
+        <p:sp>
+          <p:nvSpPr>
+            <p:cNvPr id="27" name="Oval 26"/>
+            <p:cNvSpPr>
+              <a:spLocks/>
+            </p:cNvSpPr>
+            <p:nvPr/>
+          </p:nvSpPr>
+          <p:spPr>
+            <a:xfrm>
+              <a:off x="3108960" y="2560320"/>
+              <a:ext cx="91440" cy="91440"/>
+            </a:xfrm>
+            <a:prstGeom prst="ellipse">
+              <a:avLst/>
+            </a:prstGeom>
+            <a:solidFill>
+              <a:schemeClr val="tx1"/>
+            </a:solidFill>
+          </p:spPr>
+          <p:style>
+            <a:lnRef idx="2">
+              <a:schemeClr val="accent1">
+                <a:shade val="50000"/>
+              </a:schemeClr>
+            </a:lnRef>
+            <a:fillRef idx="1">
+              <a:schemeClr val="accent1"/>
+            </a:fillRef>
+            <a:effectRef idx="0">
+              <a:schemeClr val="accent1"/>
+            </a:effectRef>
+            <a:fontRef idx="minor">
+              <a:schemeClr val="lt1"/>
+            </a:fontRef>
+          </p:style>
+          <p:txBody>
+            <a:bodyPr rtlCol="0" anchor="ctr"/>
+            <a:lstStyle/>
+            <a:p>
+              <a:pPr algn="ctr"/>
+              <a:endParaRPr lang="en-US"/>
+            </a:p>
+          </p:txBody>
+        </p:sp>
+        <p:sp>
+          <p:nvSpPr>
+            <p:cNvPr id="28" name="Oval 27"/>
+            <p:cNvSpPr>
+              <a:spLocks/>
+            </p:cNvSpPr>
+            <p:nvPr/>
+          </p:nvSpPr>
+          <p:spPr>
+            <a:xfrm>
+              <a:off x="3657600" y="2560320"/>
+              <a:ext cx="91440" cy="91440"/>
+            </a:xfrm>
+            <a:prstGeom prst="ellipse">
+              <a:avLst/>
+            </a:prstGeom>
+            <a:solidFill>
+              <a:schemeClr val="tx1"/>
+            </a:solidFill>
+          </p:spPr>
+          <p:style>
+            <a:lnRef idx="2">
+              <a:schemeClr val="accent1">
+                <a:shade val="50000"/>
+              </a:schemeClr>
+            </a:lnRef>
+            <a:fillRef idx="1">
+              <a:schemeClr val="accent1"/>
+            </a:fillRef>
+            <a:effectRef idx="0">
+              <a:schemeClr val="accent1"/>
+            </a:effectRef>
+            <a:fontRef idx="minor">
+              <a:schemeClr val="lt1"/>
+            </a:fontRef>
+          </p:style>
+          <p:txBody>
+            <a:bodyPr rtlCol="0" anchor="ctr"/>
+            <a:lstStyle/>
+            <a:p>
+              <a:pPr algn="ctr"/>
+              <a:endParaRPr lang="en-US"/>
+            </a:p>
+          </p:txBody>
+        </p:sp>
+        <p:sp>
+          <p:nvSpPr>
+            <p:cNvPr id="29" name="Oval 28"/>
+            <p:cNvSpPr>
+              <a:spLocks/>
+            </p:cNvSpPr>
+            <p:nvPr/>
+          </p:nvSpPr>
+          <p:spPr>
+            <a:xfrm>
+              <a:off x="914400" y="3108960"/>
+              <a:ext cx="91440" cy="91440"/>
+            </a:xfrm>
+            <a:prstGeom prst="ellipse">
+              <a:avLst/>
+            </a:prstGeom>
+            <a:solidFill>
+              <a:schemeClr val="tx1"/>
+            </a:solidFill>
+          </p:spPr>
+          <p:style>
+            <a:lnRef idx="2">
+              <a:schemeClr val="accent1">
+                <a:shade val="50000"/>
+              </a:schemeClr>
+            </a:lnRef>
+            <a:fillRef idx="1">
+              <a:schemeClr val="accent1"/>
+            </a:fillRef>
+            <a:effectRef idx="0">
+              <a:schemeClr val="accent1"/>
+            </a:effectRef>
+            <a:fontRef idx="minor">
+              <a:schemeClr val="lt1"/>
+            </a:fontRef>
+          </p:style>
+          <p:txBody>
+            <a:bodyPr rtlCol="0" anchor="ctr"/>
+            <a:lstStyle/>
+            <a:p>
+              <a:pPr algn="ctr"/>
+              <a:endParaRPr lang="en-US"/>
+            </a:p>
+          </p:txBody>
+        </p:sp>
+        <p:sp>
+          <p:nvSpPr>
+            <p:cNvPr id="30" name="Oval 29"/>
+            <p:cNvSpPr>
+              <a:spLocks/>
+            </p:cNvSpPr>
+            <p:nvPr/>
+          </p:nvSpPr>
+          <p:spPr>
+            <a:xfrm>
+              <a:off x="1463040" y="3108960"/>
+              <a:ext cx="91440" cy="91440"/>
+            </a:xfrm>
+            <a:prstGeom prst="ellipse">
+              <a:avLst/>
+            </a:prstGeom>
+            <a:solidFill>
+              <a:schemeClr val="tx1"/>
+            </a:solidFill>
+          </p:spPr>
+          <p:style>
+            <a:lnRef idx="2">
+              <a:schemeClr val="accent1">
+                <a:shade val="50000"/>
+              </a:schemeClr>
+            </a:lnRef>
+            <a:fillRef idx="1">
+              <a:schemeClr val="accent1"/>
+            </a:fillRef>
+            <a:effectRef idx="0">
+              <a:schemeClr val="accent1"/>
+            </a:effectRef>
+            <a:fontRef idx="minor">
+              <a:schemeClr val="lt1"/>
+            </a:fontRef>
+          </p:style>
+          <p:txBody>
+            <a:bodyPr rtlCol="0" anchor="ctr"/>
+            <a:lstStyle/>
+            <a:p>
+              <a:pPr algn="ctr"/>
+              <a:endParaRPr lang="en-US"/>
+            </a:p>
+          </p:txBody>
+        </p:sp>
+        <p:sp>
+          <p:nvSpPr>
+            <p:cNvPr id="31" name="Oval 30"/>
+            <p:cNvSpPr>
+              <a:spLocks/>
+            </p:cNvSpPr>
+            <p:nvPr/>
+          </p:nvSpPr>
+          <p:spPr>
+            <a:xfrm>
+              <a:off x="2011680" y="3108960"/>
+              <a:ext cx="91440" cy="91440"/>
+            </a:xfrm>
+            <a:prstGeom prst="ellipse">
+              <a:avLst/>
+            </a:prstGeom>
+            <a:solidFill>
+              <a:schemeClr val="tx1"/>
+            </a:solidFill>
+          </p:spPr>
+          <p:style>
+            <a:lnRef idx="2">
+              <a:schemeClr val="accent1">
+                <a:shade val="50000"/>
+              </a:schemeClr>
+            </a:lnRef>
+            <a:fillRef idx="1">
+              <a:schemeClr val="accent1"/>
+            </a:fillRef>
+            <a:effectRef idx="0">
+              <a:schemeClr val="accent1"/>
+            </a:effectRef>
+            <a:fontRef idx="minor">
+              <a:schemeClr val="lt1"/>
+            </a:fontRef>
+          </p:style>
+          <p:txBody>
+            <a:bodyPr rtlCol="0" anchor="ctr"/>
+            <a:lstStyle/>
+            <a:p>
+              <a:pPr algn="ctr"/>
+              <a:endParaRPr lang="en-US"/>
+            </a:p>
+          </p:txBody>
+        </p:sp>
+        <p:sp>
+          <p:nvSpPr>
+            <p:cNvPr id="32" name="Oval 31"/>
+            <p:cNvSpPr>
+              <a:spLocks/>
+            </p:cNvSpPr>
+            <p:nvPr/>
+          </p:nvSpPr>
+          <p:spPr>
+            <a:xfrm>
+              <a:off x="2560320" y="3108960"/>
+              <a:ext cx="91440" cy="91440"/>
+            </a:xfrm>
+            <a:prstGeom prst="ellipse">
+              <a:avLst/>
+            </a:prstGeom>
+            <a:solidFill>
+              <a:schemeClr val="tx1"/>
+            </a:solidFill>
+          </p:spPr>
+          <p:style>
+            <a:lnRef idx="2">
+              <a:schemeClr val="accent1">
+                <a:shade val="50000"/>
+              </a:schemeClr>
+            </a:lnRef>
+            <a:fillRef idx="1">
+              <a:schemeClr val="accent1"/>
+            </a:fillRef>
+            <a:effectRef idx="0">
+              <a:schemeClr val="accent1"/>
+            </a:effectRef>
+            <a:fontRef idx="minor">
+              <a:schemeClr val="lt1"/>
+            </a:fontRef>
+          </p:style>
+          <p:txBody>
+            <a:bodyPr rtlCol="0" anchor="ctr"/>
+            <a:lstStyle/>
+            <a:p>
+              <a:pPr algn="ctr"/>
+              <a:endParaRPr lang="en-US"/>
+            </a:p>
+          </p:txBody>
+        </p:sp>
+        <p:sp>
+          <p:nvSpPr>
+            <p:cNvPr id="33" name="Oval 32"/>
+            <p:cNvSpPr>
+              <a:spLocks/>
+            </p:cNvSpPr>
+            <p:nvPr/>
+          </p:nvSpPr>
+          <p:spPr>
+            <a:xfrm>
+              <a:off x="3108960" y="3108960"/>
+              <a:ext cx="91440" cy="91440"/>
+            </a:xfrm>
+            <a:prstGeom prst="ellipse">
+              <a:avLst/>
+            </a:prstGeom>
+            <a:solidFill>
+              <a:schemeClr val="tx1"/>
+            </a:solidFill>
+          </p:spPr>
+          <p:style>
+            <a:lnRef idx="2">
+              <a:schemeClr val="accent1">
+                <a:shade val="50000"/>
+              </a:schemeClr>
+            </a:lnRef>
+            <a:fillRef idx="1">
+              <a:schemeClr val="accent1"/>
+            </a:fillRef>
+            <a:effectRef idx="0">
+              <a:schemeClr val="accent1"/>
+            </a:effectRef>
+            <a:fontRef idx="minor">
+              <a:schemeClr val="lt1"/>
+            </a:fontRef>
+          </p:style>
+          <p:txBody>
+            <a:bodyPr rtlCol="0" anchor="ctr"/>
+            <a:lstStyle/>
+            <a:p>
+              <a:pPr algn="ctr"/>
+              <a:endParaRPr lang="en-US"/>
+            </a:p>
+          </p:txBody>
+        </p:sp>
+        <p:sp>
+          <p:nvSpPr>
+            <p:cNvPr id="34" name="Oval 33"/>
+            <p:cNvSpPr>
+              <a:spLocks/>
+            </p:cNvSpPr>
+            <p:nvPr/>
+          </p:nvSpPr>
+          <p:spPr>
+            <a:xfrm>
+              <a:off x="3657600" y="3108960"/>
+              <a:ext cx="91440" cy="91440"/>
+            </a:xfrm>
+            <a:prstGeom prst="ellipse">
+              <a:avLst/>
+            </a:prstGeom>
+            <a:solidFill>
+              <a:schemeClr val="tx1"/>
+            </a:solidFill>
+          </p:spPr>
+          <p:style>
+            <a:lnRef idx="2">
+              <a:schemeClr val="accent1">
+                <a:shade val="50000"/>
+              </a:schemeClr>
+            </a:lnRef>
+            <a:fillRef idx="1">
+              <a:schemeClr val="accent1"/>
+            </a:fillRef>
+            <a:effectRef idx="0">
+              <a:schemeClr val="accent1"/>
+            </a:effectRef>
+            <a:fontRef idx="minor">
+              <a:schemeClr val="lt1"/>
+            </a:fontRef>
+          </p:style>
+          <p:txBody>
+            <a:bodyPr rtlCol="0" anchor="ctr"/>
+            <a:lstStyle/>
+            <a:p>
+              <a:pPr algn="ctr"/>
+              <a:endParaRPr lang="en-US"/>
+            </a:p>
+          </p:txBody>
+        </p:sp>
+        <p:sp>
+          <p:nvSpPr>
+            <p:cNvPr id="35" name="Oval 34"/>
+            <p:cNvSpPr>
+              <a:spLocks/>
+            </p:cNvSpPr>
+            <p:nvPr/>
+          </p:nvSpPr>
+          <p:spPr>
+            <a:xfrm>
+              <a:off x="914400" y="3657600"/>
+              <a:ext cx="91440" cy="91440"/>
+            </a:xfrm>
+            <a:prstGeom prst="ellipse">
+              <a:avLst/>
+            </a:prstGeom>
+            <a:solidFill>
+              <a:schemeClr val="tx1"/>
+            </a:solidFill>
+          </p:spPr>
+          <p:style>
+            <a:lnRef idx="2">
+              <a:schemeClr val="accent1">
+                <a:shade val="50000"/>
+              </a:schemeClr>
+            </a:lnRef>
+            <a:fillRef idx="1">
+              <a:schemeClr val="accent1"/>
+            </a:fillRef>
+            <a:effectRef idx="0">
+              <a:schemeClr val="accent1"/>
+            </a:effectRef>
+            <a:fontRef idx="minor">
+              <a:schemeClr val="lt1"/>
+            </a:fontRef>
+          </p:style>
+          <p:txBody>
+            <a:bodyPr rtlCol="0" anchor="ctr"/>
+            <a:lstStyle/>
+            <a:p>
+              <a:pPr algn="ctr"/>
+              <a:endParaRPr lang="en-US"/>
+            </a:p>
+          </p:txBody>
+        </p:sp>
+        <p:sp>
+          <p:nvSpPr>
+            <p:cNvPr id="36" name="Oval 35"/>
+            <p:cNvSpPr>
+              <a:spLocks/>
+            </p:cNvSpPr>
+            <p:nvPr/>
+          </p:nvSpPr>
+          <p:spPr>
+            <a:xfrm>
+              <a:off x="1463040" y="3657600"/>
+              <a:ext cx="91440" cy="91440"/>
+            </a:xfrm>
+            <a:prstGeom prst="ellipse">
+              <a:avLst/>
+            </a:prstGeom>
+            <a:solidFill>
+              <a:schemeClr val="tx1"/>
+            </a:solidFill>
+          </p:spPr>
+          <p:style>
+            <a:lnRef idx="2">
+              <a:schemeClr val="accent1">
+                <a:shade val="50000"/>
+              </a:schemeClr>
+            </a:lnRef>
+            <a:fillRef idx="1">
+              <a:schemeClr val="accent1"/>
+            </a:fillRef>
+            <a:effectRef idx="0">
+              <a:schemeClr val="accent1"/>
+            </a:effectRef>
+            <a:fontRef idx="minor">
+              <a:schemeClr val="lt1"/>
+            </a:fontRef>
+          </p:style>
+          <p:txBody>
+            <a:bodyPr rtlCol="0" anchor="ctr"/>
+            <a:lstStyle/>
+            <a:p>
+              <a:pPr algn="ctr"/>
+              <a:endParaRPr lang="en-US"/>
+            </a:p>
+          </p:txBody>
+        </p:sp>
+        <p:sp>
+          <p:nvSpPr>
+            <p:cNvPr id="37" name="Oval 36"/>
+            <p:cNvSpPr>
+              <a:spLocks/>
+            </p:cNvSpPr>
+            <p:nvPr/>
+          </p:nvSpPr>
+          <p:spPr>
+            <a:xfrm>
+              <a:off x="2011680" y="3657600"/>
+              <a:ext cx="91440" cy="91440"/>
+            </a:xfrm>
+            <a:prstGeom prst="ellipse">
+              <a:avLst/>
+            </a:prstGeom>
+            <a:solidFill>
+              <a:schemeClr val="tx1"/>
+            </a:solidFill>
+          </p:spPr>
+          <p:style>
+            <a:lnRef idx="2">
+              <a:schemeClr val="accent1">
+                <a:shade val="50000"/>
+              </a:schemeClr>
+            </a:lnRef>
+            <a:fillRef idx="1">
+              <a:schemeClr val="accent1"/>
+            </a:fillRef>
+            <a:effectRef idx="0">
+              <a:schemeClr val="accent1"/>
+            </a:effectRef>
+            <a:fontRef idx="minor">
+              <a:schemeClr val="lt1"/>
+            </a:fontRef>
+          </p:style>
+          <p:txBody>
+            <a:bodyPr rtlCol="0" anchor="ctr"/>
+            <a:lstStyle/>
+            <a:p>
+              <a:pPr algn="ctr"/>
+              <a:endParaRPr lang="en-US"/>
+            </a:p>
+          </p:txBody>
+        </p:sp>
+        <p:sp>
+          <p:nvSpPr>
+            <p:cNvPr id="38" name="Oval 37"/>
+            <p:cNvSpPr>
+              <a:spLocks/>
+            </p:cNvSpPr>
+            <p:nvPr/>
+          </p:nvSpPr>
+          <p:spPr>
+            <a:xfrm>
+              <a:off x="2560320" y="3657600"/>
+              <a:ext cx="91440" cy="91440"/>
+            </a:xfrm>
+            <a:prstGeom prst="ellipse">
+              <a:avLst/>
+            </a:prstGeom>
+            <a:solidFill>
+              <a:schemeClr val="tx1"/>
+            </a:solidFill>
+          </p:spPr>
+          <p:style>
+            <a:lnRef idx="2">
+              <a:schemeClr val="accent1">
+                <a:shade val="50000"/>
+              </a:schemeClr>
+            </a:lnRef>
+            <a:fillRef idx="1">
+              <a:schemeClr val="accent1"/>
+            </a:fillRef>
+            <a:effectRef idx="0">
+              <a:schemeClr val="accent1"/>
+            </a:effectRef>
+            <a:fontRef idx="minor">
+              <a:schemeClr val="lt1"/>
+            </a:fontRef>
+          </p:style>
+          <p:txBody>
+            <a:bodyPr rtlCol="0" anchor="ctr"/>
+            <a:lstStyle/>
+            <a:p>
+              <a:pPr algn="ctr"/>
+              <a:endParaRPr lang="en-US"/>
+            </a:p>
+          </p:txBody>
+        </p:sp>
+        <p:sp>
+          <p:nvSpPr>
+            <p:cNvPr id="39" name="Oval 38"/>
+            <p:cNvSpPr>
+              <a:spLocks/>
+            </p:cNvSpPr>
+            <p:nvPr/>
+          </p:nvSpPr>
+          <p:spPr>
+            <a:xfrm>
+              <a:off x="3108960" y="3657600"/>
+              <a:ext cx="91440" cy="91440"/>
+            </a:xfrm>
+            <a:prstGeom prst="ellipse">
+              <a:avLst/>
+            </a:prstGeom>
+            <a:solidFill>
+              <a:schemeClr val="tx1"/>
+            </a:solidFill>
+          </p:spPr>
+          <p:style>
+            <a:lnRef idx="2">
+              <a:schemeClr val="accent1">
+                <a:shade val="50000"/>
+              </a:schemeClr>
+            </a:lnRef>
+            <a:fillRef idx="1">
+              <a:schemeClr val="accent1"/>
+            </a:fillRef>
+            <a:effectRef idx="0">
+              <a:schemeClr val="accent1"/>
+            </a:effectRef>
+            <a:fontRef idx="minor">
+              <a:schemeClr val="lt1"/>
+            </a:fontRef>
+          </p:style>
+          <p:txBody>
+            <a:bodyPr rtlCol="0" anchor="ctr"/>
+            <a:lstStyle/>
+            <a:p>
+              <a:pPr algn="ctr"/>
+              <a:endParaRPr lang="en-US"/>
+            </a:p>
+          </p:txBody>
+        </p:sp>
+        <p:sp>
+          <p:nvSpPr>
+            <p:cNvPr id="40" name="Oval 39"/>
+            <p:cNvSpPr>
+              <a:spLocks/>
+            </p:cNvSpPr>
+            <p:nvPr/>
+          </p:nvSpPr>
+          <p:spPr>
+            <a:xfrm>
+              <a:off x="3657600" y="3657600"/>
+              <a:ext cx="91440" cy="91440"/>
+            </a:xfrm>
+            <a:prstGeom prst="ellipse">
+              <a:avLst/>
+            </a:prstGeom>
+            <a:solidFill>
+              <a:schemeClr val="tx1"/>
+            </a:solidFill>
+          </p:spPr>
+          <p:style>
+            <a:lnRef idx="2">
+              <a:schemeClr val="accent1">
+                <a:shade val="50000"/>
+              </a:schemeClr>
+            </a:lnRef>
+            <a:fillRef idx="1">
+              <a:schemeClr val="accent1"/>
+            </a:fillRef>
+            <a:effectRef idx="0">
+              <a:schemeClr val="accent1"/>
+            </a:effectRef>
+            <a:fontRef idx="minor">
+              <a:schemeClr val="lt1"/>
+            </a:fontRef>
+          </p:style>
+          <p:txBody>
+            <a:bodyPr rtlCol="0" anchor="ctr"/>
+            <a:lstStyle/>
+            <a:p>
+              <a:pPr algn="ctr"/>
+              <a:endParaRPr lang="en-US"/>
+            </a:p>
+          </p:txBody>
+        </p:sp>
+      </p:grpSp>
+      <p:sp>
+        <p:nvSpPr>
+          <p:cNvPr id="41" name="TextBox 40"/>
+          <p:cNvSpPr txBox="1"/>
+          <p:nvPr/>
+        </p:nvSpPr>
+        <p:spPr>
+          <a:xfrm>
+            <a:off x="4191000" y="4343400"/>
+            <a:ext cx="1539845" cy="369332"/>
+          </a:xfrm>
+          <a:prstGeom prst="rect">
+            <a:avLst/>
+          </a:prstGeom>
+          <a:noFill/>
+        </p:spPr>
+        <p:txBody>
+          <a:bodyPr wrap="none" rtlCol="0">
+            <a:spAutoFit/>
+          </a:bodyPr>
+          <a:lstStyle/>
+          <a:p>
+            <a:r>
+              <a:rPr lang="en-US" dirty="0" smtClean="0"/>
+              <a:t>View direction</a:t>
+            </a:r>
+            <a:endParaRPr lang="en-US" dirty="0"/>
+          </a:p>
+        </p:txBody>
+      </p:sp>
+      <p:sp>
+        <p:nvSpPr>
+          <p:cNvPr id="42" name="Up Arrow 41"/>
+          <p:cNvSpPr/>
+          <p:nvPr/>
+        </p:nvSpPr>
+        <p:spPr>
+          <a:xfrm rot="19167364">
+            <a:off x="3741038" y="4113242"/>
+            <a:ext cx="304800" cy="838200"/>
+          </a:xfrm>
+          <a:prstGeom prst="upArrow">
+            <a:avLst/>
+          </a:prstGeom>
+        </p:spPr>
+        <p:style>
+          <a:lnRef idx="2">
+            <a:schemeClr val="accent1">
+              <a:shade val="50000"/>
+            </a:schemeClr>
+          </a:lnRef>
+          <a:fillRef idx="1">
+            <a:schemeClr val="accent1"/>
+          </a:fillRef>
+          <a:effectRef idx="0">
+            <a:schemeClr val="accent1"/>
+          </a:effectRef>
+          <a:fontRef idx="minor">
+            <a:schemeClr val="lt1"/>
+          </a:fontRef>
+        </p:style>
+        <p:txBody>
+          <a:bodyPr rtlCol="0" anchor="ctr"/>
+          <a:lstStyle/>
+          <a:p>
+            <a:pPr algn="ctr"/>
+            <a:endParaRPr lang="en-US"/>
+          </a:p>
+        </p:txBody>
+      </p:sp>
+      <p:cxnSp>
+        <p:nvCxnSpPr>
+          <p:cNvPr id="55" name="Straight Connector 54"/>
+          <p:cNvCxnSpPr/>
+          <p:nvPr/>
+        </p:nvCxnSpPr>
+        <p:spPr>
+          <a:xfrm flipV="1">
+            <a:off x="477982" y="1153391"/>
+            <a:ext cx="3803073" cy="2306783"/>
+          </a:xfrm>
+          <a:prstGeom prst="line">
+            <a:avLst/>
+          </a:prstGeom>
+          <a:ln w="25400">
+            <a:solidFill>
+              <a:schemeClr val="tx1"/>
+            </a:solidFill>
+          </a:ln>
+        </p:spPr>
+        <p:style>
+          <a:lnRef idx="1">
+            <a:schemeClr val="accent1"/>
+          </a:lnRef>
+          <a:fillRef idx="0">
+            <a:schemeClr val="accent1"/>
+          </a:fillRef>
+          <a:effectRef idx="0">
+            <a:schemeClr val="accent1"/>
+          </a:effectRef>
+          <a:fontRef idx="minor">
+            <a:schemeClr val="tx1"/>
+          </a:fontRef>
+        </p:style>
+      </p:cxnSp>
+      <p:cxnSp>
+        <p:nvCxnSpPr>
+          <p:cNvPr id="61" name="Straight Connector 60"/>
+          <p:cNvCxnSpPr/>
+          <p:nvPr/>
+        </p:nvCxnSpPr>
+        <p:spPr>
+          <a:xfrm flipV="1">
+            <a:off x="311727" y="820882"/>
+            <a:ext cx="3771900" cy="2296391"/>
+          </a:xfrm>
+          <a:prstGeom prst="line">
+            <a:avLst/>
+          </a:prstGeom>
+          <a:ln w="25400">
+            <a:solidFill>
+              <a:schemeClr val="tx1"/>
+            </a:solidFill>
+          </a:ln>
+        </p:spPr>
+        <p:style>
+          <a:lnRef idx="1">
+            <a:schemeClr val="accent1"/>
+          </a:lnRef>
+          <a:fillRef idx="0">
+            <a:schemeClr val="accent1"/>
+          </a:fillRef>
+          <a:effectRef idx="0">
+            <a:schemeClr val="accent1"/>
+          </a:effectRef>
+          <a:fontRef idx="minor">
+            <a:schemeClr val="tx1"/>
+          </a:fontRef>
+        </p:style>
+      </p:cxnSp>
+      <p:cxnSp>
+        <p:nvCxnSpPr>
+          <p:cNvPr id="62" name="Straight Connector 61"/>
+          <p:cNvCxnSpPr/>
+          <p:nvPr/>
+        </p:nvCxnSpPr>
+        <p:spPr>
+          <a:xfrm flipV="1">
+            <a:off x="228600" y="415636"/>
+            <a:ext cx="3813464" cy="2272148"/>
+          </a:xfrm>
+          <a:prstGeom prst="line">
+            <a:avLst/>
+          </a:prstGeom>
+          <a:ln w="25400">
+            <a:solidFill>
+              <a:schemeClr val="tx1"/>
+            </a:solidFill>
+          </a:ln>
+        </p:spPr>
+        <p:style>
+          <a:lnRef idx="1">
+            <a:schemeClr val="accent1"/>
+          </a:lnRef>
+          <a:fillRef idx="0">
+            <a:schemeClr val="accent1"/>
+          </a:fillRef>
+          <a:effectRef idx="0">
+            <a:schemeClr val="accent1"/>
+          </a:effectRef>
+          <a:fontRef idx="minor">
+            <a:schemeClr val="tx1"/>
+          </a:fontRef>
+        </p:style>
+      </p:cxnSp>
+      <p:sp>
+        <p:nvSpPr>
+          <p:cNvPr id="3" name="TextBox 2"/>
+          <p:cNvSpPr txBox="1"/>
+          <p:nvPr/>
+        </p:nvSpPr>
+        <p:spPr>
+          <a:xfrm>
+            <a:off x="6174973" y="1270181"/>
+            <a:ext cx="1978427" cy="369332"/>
+          </a:xfrm>
+          <a:prstGeom prst="rect">
+            <a:avLst/>
+          </a:prstGeom>
+          <a:noFill/>
+        </p:spPr>
+        <p:txBody>
+          <a:bodyPr wrap="none" rtlCol="0">
+            <a:spAutoFit/>
+          </a:bodyPr>
+          <a:lstStyle/>
+          <a:p>
+            <a:r>
+              <a:rPr lang="en-US" dirty="0" smtClean="0"/>
+              <a:t>.875 2.625 .75 4.25</a:t>
+            </a:r>
+            <a:endParaRPr lang="en-US" dirty="0"/>
+          </a:p>
+        </p:txBody>
+      </p:sp>
+    </p:spTree>
+  </p:cSld>
+  <p:clrMapOvr>
+    <a:masterClrMapping/>
+  </p:clrMapOvr>
+  <p:timing>
+    <p:tnLst>
+      <p:par>
+        <p:cTn id="1" dur="indefinite" restart="never" nodeType="tmRoot"/>
+      </p:par>
+    </p:tnLst>
+  </p:timing>
+</p:sld>
+</file>
+
+<file path=ppt/slides/slide4.xml><?xml version="1.0" encoding="utf-8"?>
 <p:sld xmlns:a="http://schemas.openxmlformats.org/drawingml/2006/main" xmlns:r="http://schemas.openxmlformats.org/officeDocument/2006/relationships" xmlns:p="http://schemas.openxmlformats.org/presentationml/2006/main">
   <p:cSld>
     <p:spTree>
@@ -9099,1676 +11020,16 @@
           </a:fontRef>
         </p:style>
       </p:cxnSp>
-    </p:spTree>
-  </p:cSld>
-  <p:clrMapOvr>
-    <a:masterClrMapping/>
-  </p:clrMapOvr>
-</p:sld>
-</file>
-
-<file path=ppt/slides/slide4.xml><?xml version="1.0" encoding="utf-8"?>
-<p:sld xmlns:a="http://schemas.openxmlformats.org/drawingml/2006/main" xmlns:r="http://schemas.openxmlformats.org/officeDocument/2006/relationships" xmlns:p="http://schemas.openxmlformats.org/presentationml/2006/main">
-  <p:cSld>
-    <p:spTree>
-      <p:nvGrpSpPr>
-        <p:cNvPr id="1" name=""/>
-        <p:cNvGrpSpPr/>
-        <p:nvPr/>
-      </p:nvGrpSpPr>
-      <p:grpSpPr>
-        <a:xfrm>
-          <a:off x="0" y="0"/>
-          <a:ext cx="0" cy="0"/>
-          <a:chOff x="0" y="0"/>
-          <a:chExt cx="0" cy="0"/>
-        </a:xfrm>
-      </p:grpSpPr>
-      <p:grpSp>
-        <p:nvGrpSpPr>
-          <p:cNvPr id="2" name="Group 3"/>
-          <p:cNvGrpSpPr/>
-          <p:nvPr/>
-        </p:nvGrpSpPr>
-        <p:grpSpPr>
-          <a:xfrm rot="825045">
-            <a:off x="914400" y="914400"/>
-            <a:ext cx="2834640" cy="2834640"/>
-            <a:chOff x="914400" y="914400"/>
-            <a:chExt cx="2834640" cy="2834640"/>
-          </a:xfrm>
-        </p:grpSpPr>
-        <p:sp>
-          <p:nvSpPr>
-            <p:cNvPr id="5" name="Oval 4"/>
-            <p:cNvSpPr>
-              <a:spLocks/>
-            </p:cNvSpPr>
-            <p:nvPr/>
-          </p:nvSpPr>
-          <p:spPr>
-            <a:xfrm>
-              <a:off x="914400" y="914400"/>
-              <a:ext cx="91440" cy="91440"/>
-            </a:xfrm>
-            <a:prstGeom prst="ellipse">
-              <a:avLst/>
-            </a:prstGeom>
-            <a:solidFill>
-              <a:schemeClr val="tx1"/>
-            </a:solidFill>
-          </p:spPr>
-          <p:style>
-            <a:lnRef idx="2">
-              <a:schemeClr val="accent1">
-                <a:shade val="50000"/>
-              </a:schemeClr>
-            </a:lnRef>
-            <a:fillRef idx="1">
-              <a:schemeClr val="accent1"/>
-            </a:fillRef>
-            <a:effectRef idx="0">
-              <a:schemeClr val="accent1"/>
-            </a:effectRef>
-            <a:fontRef idx="minor">
-              <a:schemeClr val="lt1"/>
-            </a:fontRef>
-          </p:style>
-          <p:txBody>
-            <a:bodyPr rtlCol="0" anchor="ctr"/>
-            <a:lstStyle/>
-            <a:p>
-              <a:pPr algn="ctr"/>
-              <a:endParaRPr lang="en-US"/>
-            </a:p>
-          </p:txBody>
-        </p:sp>
-        <p:sp>
-          <p:nvSpPr>
-            <p:cNvPr id="6" name="Oval 5"/>
-            <p:cNvSpPr>
-              <a:spLocks/>
-            </p:cNvSpPr>
-            <p:nvPr/>
-          </p:nvSpPr>
-          <p:spPr>
-            <a:xfrm>
-              <a:off x="1463040" y="914400"/>
-              <a:ext cx="91440" cy="91440"/>
-            </a:xfrm>
-            <a:prstGeom prst="ellipse">
-              <a:avLst/>
-            </a:prstGeom>
-            <a:solidFill>
-              <a:schemeClr val="tx1"/>
-            </a:solidFill>
-          </p:spPr>
-          <p:style>
-            <a:lnRef idx="2">
-              <a:schemeClr val="accent1">
-                <a:shade val="50000"/>
-              </a:schemeClr>
-            </a:lnRef>
-            <a:fillRef idx="1">
-              <a:schemeClr val="accent1"/>
-            </a:fillRef>
-            <a:effectRef idx="0">
-              <a:schemeClr val="accent1"/>
-            </a:effectRef>
-            <a:fontRef idx="minor">
-              <a:schemeClr val="lt1"/>
-            </a:fontRef>
-          </p:style>
-          <p:txBody>
-            <a:bodyPr rtlCol="0" anchor="ctr"/>
-            <a:lstStyle/>
-            <a:p>
-              <a:pPr algn="ctr"/>
-              <a:endParaRPr lang="en-US"/>
-            </a:p>
-          </p:txBody>
-        </p:sp>
-        <p:sp>
-          <p:nvSpPr>
-            <p:cNvPr id="7" name="Oval 6"/>
-            <p:cNvSpPr>
-              <a:spLocks/>
-            </p:cNvSpPr>
-            <p:nvPr/>
-          </p:nvSpPr>
-          <p:spPr>
-            <a:xfrm>
-              <a:off x="2011680" y="914400"/>
-              <a:ext cx="91440" cy="91440"/>
-            </a:xfrm>
-            <a:prstGeom prst="ellipse">
-              <a:avLst/>
-            </a:prstGeom>
-            <a:solidFill>
-              <a:schemeClr val="tx1"/>
-            </a:solidFill>
-          </p:spPr>
-          <p:style>
-            <a:lnRef idx="2">
-              <a:schemeClr val="accent1">
-                <a:shade val="50000"/>
-              </a:schemeClr>
-            </a:lnRef>
-            <a:fillRef idx="1">
-              <a:schemeClr val="accent1"/>
-            </a:fillRef>
-            <a:effectRef idx="0">
-              <a:schemeClr val="accent1"/>
-            </a:effectRef>
-            <a:fontRef idx="minor">
-              <a:schemeClr val="lt1"/>
-            </a:fontRef>
-          </p:style>
-          <p:txBody>
-            <a:bodyPr rtlCol="0" anchor="ctr"/>
-            <a:lstStyle/>
-            <a:p>
-              <a:pPr algn="ctr"/>
-              <a:endParaRPr lang="en-US"/>
-            </a:p>
-          </p:txBody>
-        </p:sp>
-        <p:sp>
-          <p:nvSpPr>
-            <p:cNvPr id="8" name="Oval 7"/>
-            <p:cNvSpPr>
-              <a:spLocks/>
-            </p:cNvSpPr>
-            <p:nvPr/>
-          </p:nvSpPr>
-          <p:spPr>
-            <a:xfrm>
-              <a:off x="2560320" y="914400"/>
-              <a:ext cx="91440" cy="91440"/>
-            </a:xfrm>
-            <a:prstGeom prst="ellipse">
-              <a:avLst/>
-            </a:prstGeom>
-            <a:solidFill>
-              <a:schemeClr val="tx1"/>
-            </a:solidFill>
-          </p:spPr>
-          <p:style>
-            <a:lnRef idx="2">
-              <a:schemeClr val="accent1">
-                <a:shade val="50000"/>
-              </a:schemeClr>
-            </a:lnRef>
-            <a:fillRef idx="1">
-              <a:schemeClr val="accent1"/>
-            </a:fillRef>
-            <a:effectRef idx="0">
-              <a:schemeClr val="accent1"/>
-            </a:effectRef>
-            <a:fontRef idx="minor">
-              <a:schemeClr val="lt1"/>
-            </a:fontRef>
-          </p:style>
-          <p:txBody>
-            <a:bodyPr rtlCol="0" anchor="ctr"/>
-            <a:lstStyle/>
-            <a:p>
-              <a:pPr algn="ctr"/>
-              <a:endParaRPr lang="en-US"/>
-            </a:p>
-          </p:txBody>
-        </p:sp>
-        <p:sp>
-          <p:nvSpPr>
-            <p:cNvPr id="9" name="Oval 8"/>
-            <p:cNvSpPr>
-              <a:spLocks/>
-            </p:cNvSpPr>
-            <p:nvPr/>
-          </p:nvSpPr>
-          <p:spPr>
-            <a:xfrm>
-              <a:off x="3108960" y="914400"/>
-              <a:ext cx="91440" cy="91440"/>
-            </a:xfrm>
-            <a:prstGeom prst="ellipse">
-              <a:avLst/>
-            </a:prstGeom>
-            <a:solidFill>
-              <a:schemeClr val="tx1"/>
-            </a:solidFill>
-          </p:spPr>
-          <p:style>
-            <a:lnRef idx="2">
-              <a:schemeClr val="accent1">
-                <a:shade val="50000"/>
-              </a:schemeClr>
-            </a:lnRef>
-            <a:fillRef idx="1">
-              <a:schemeClr val="accent1"/>
-            </a:fillRef>
-            <a:effectRef idx="0">
-              <a:schemeClr val="accent1"/>
-            </a:effectRef>
-            <a:fontRef idx="minor">
-              <a:schemeClr val="lt1"/>
-            </a:fontRef>
-          </p:style>
-          <p:txBody>
-            <a:bodyPr rtlCol="0" anchor="ctr"/>
-            <a:lstStyle/>
-            <a:p>
-              <a:pPr algn="ctr"/>
-              <a:endParaRPr lang="en-US"/>
-            </a:p>
-          </p:txBody>
-        </p:sp>
-        <p:sp>
-          <p:nvSpPr>
-            <p:cNvPr id="10" name="Oval 9"/>
-            <p:cNvSpPr>
-              <a:spLocks/>
-            </p:cNvSpPr>
-            <p:nvPr/>
-          </p:nvSpPr>
-          <p:spPr>
-            <a:xfrm>
-              <a:off x="3657600" y="914400"/>
-              <a:ext cx="91440" cy="91440"/>
-            </a:xfrm>
-            <a:prstGeom prst="ellipse">
-              <a:avLst/>
-            </a:prstGeom>
-            <a:solidFill>
-              <a:schemeClr val="tx1"/>
-            </a:solidFill>
-          </p:spPr>
-          <p:style>
-            <a:lnRef idx="2">
-              <a:schemeClr val="accent1">
-                <a:shade val="50000"/>
-              </a:schemeClr>
-            </a:lnRef>
-            <a:fillRef idx="1">
-              <a:schemeClr val="accent1"/>
-            </a:fillRef>
-            <a:effectRef idx="0">
-              <a:schemeClr val="accent1"/>
-            </a:effectRef>
-            <a:fontRef idx="minor">
-              <a:schemeClr val="lt1"/>
-            </a:fontRef>
-          </p:style>
-          <p:txBody>
-            <a:bodyPr rtlCol="0" anchor="ctr"/>
-            <a:lstStyle/>
-            <a:p>
-              <a:pPr algn="ctr"/>
-              <a:endParaRPr lang="en-US"/>
-            </a:p>
-          </p:txBody>
-        </p:sp>
-        <p:sp>
-          <p:nvSpPr>
-            <p:cNvPr id="11" name="Oval 10"/>
-            <p:cNvSpPr>
-              <a:spLocks/>
-            </p:cNvSpPr>
-            <p:nvPr/>
-          </p:nvSpPr>
-          <p:spPr>
-            <a:xfrm>
-              <a:off x="914400" y="1463040"/>
-              <a:ext cx="91440" cy="91440"/>
-            </a:xfrm>
-            <a:prstGeom prst="ellipse">
-              <a:avLst/>
-            </a:prstGeom>
-            <a:solidFill>
-              <a:schemeClr val="tx1"/>
-            </a:solidFill>
-          </p:spPr>
-          <p:style>
-            <a:lnRef idx="2">
-              <a:schemeClr val="accent1">
-                <a:shade val="50000"/>
-              </a:schemeClr>
-            </a:lnRef>
-            <a:fillRef idx="1">
-              <a:schemeClr val="accent1"/>
-            </a:fillRef>
-            <a:effectRef idx="0">
-              <a:schemeClr val="accent1"/>
-            </a:effectRef>
-            <a:fontRef idx="minor">
-              <a:schemeClr val="lt1"/>
-            </a:fontRef>
-          </p:style>
-          <p:txBody>
-            <a:bodyPr rtlCol="0" anchor="ctr"/>
-            <a:lstStyle/>
-            <a:p>
-              <a:pPr algn="ctr"/>
-              <a:endParaRPr lang="en-US"/>
-            </a:p>
-          </p:txBody>
-        </p:sp>
-        <p:sp>
-          <p:nvSpPr>
-            <p:cNvPr id="12" name="Oval 11"/>
-            <p:cNvSpPr>
-              <a:spLocks/>
-            </p:cNvSpPr>
-            <p:nvPr/>
-          </p:nvSpPr>
-          <p:spPr>
-            <a:xfrm>
-              <a:off x="1463040" y="1463040"/>
-              <a:ext cx="91440" cy="91440"/>
-            </a:xfrm>
-            <a:prstGeom prst="ellipse">
-              <a:avLst/>
-            </a:prstGeom>
-            <a:solidFill>
-              <a:schemeClr val="tx1"/>
-            </a:solidFill>
-          </p:spPr>
-          <p:style>
-            <a:lnRef idx="2">
-              <a:schemeClr val="accent1">
-                <a:shade val="50000"/>
-              </a:schemeClr>
-            </a:lnRef>
-            <a:fillRef idx="1">
-              <a:schemeClr val="accent1"/>
-            </a:fillRef>
-            <a:effectRef idx="0">
-              <a:schemeClr val="accent1"/>
-            </a:effectRef>
-            <a:fontRef idx="minor">
-              <a:schemeClr val="lt1"/>
-            </a:fontRef>
-          </p:style>
-          <p:txBody>
-            <a:bodyPr rtlCol="0" anchor="ctr"/>
-            <a:lstStyle/>
-            <a:p>
-              <a:pPr algn="ctr"/>
-              <a:endParaRPr lang="en-US"/>
-            </a:p>
-          </p:txBody>
-        </p:sp>
-        <p:sp>
-          <p:nvSpPr>
-            <p:cNvPr id="13" name="Oval 12"/>
-            <p:cNvSpPr>
-              <a:spLocks/>
-            </p:cNvSpPr>
-            <p:nvPr/>
-          </p:nvSpPr>
-          <p:spPr>
-            <a:xfrm>
-              <a:off x="2011680" y="1463040"/>
-              <a:ext cx="91440" cy="91440"/>
-            </a:xfrm>
-            <a:prstGeom prst="ellipse">
-              <a:avLst/>
-            </a:prstGeom>
-            <a:solidFill>
-              <a:schemeClr val="tx1"/>
-            </a:solidFill>
-          </p:spPr>
-          <p:style>
-            <a:lnRef idx="2">
-              <a:schemeClr val="accent1">
-                <a:shade val="50000"/>
-              </a:schemeClr>
-            </a:lnRef>
-            <a:fillRef idx="1">
-              <a:schemeClr val="accent1"/>
-            </a:fillRef>
-            <a:effectRef idx="0">
-              <a:schemeClr val="accent1"/>
-            </a:effectRef>
-            <a:fontRef idx="minor">
-              <a:schemeClr val="lt1"/>
-            </a:fontRef>
-          </p:style>
-          <p:txBody>
-            <a:bodyPr rtlCol="0" anchor="ctr"/>
-            <a:lstStyle/>
-            <a:p>
-              <a:pPr algn="ctr"/>
-              <a:endParaRPr lang="en-US"/>
-            </a:p>
-          </p:txBody>
-        </p:sp>
-        <p:sp>
-          <p:nvSpPr>
-            <p:cNvPr id="14" name="Oval 13"/>
-            <p:cNvSpPr>
-              <a:spLocks/>
-            </p:cNvSpPr>
-            <p:nvPr/>
-          </p:nvSpPr>
-          <p:spPr>
-            <a:xfrm>
-              <a:off x="2560320" y="1463040"/>
-              <a:ext cx="91440" cy="91440"/>
-            </a:xfrm>
-            <a:prstGeom prst="ellipse">
-              <a:avLst/>
-            </a:prstGeom>
-            <a:solidFill>
-              <a:schemeClr val="tx1"/>
-            </a:solidFill>
-          </p:spPr>
-          <p:style>
-            <a:lnRef idx="2">
-              <a:schemeClr val="accent1">
-                <a:shade val="50000"/>
-              </a:schemeClr>
-            </a:lnRef>
-            <a:fillRef idx="1">
-              <a:schemeClr val="accent1"/>
-            </a:fillRef>
-            <a:effectRef idx="0">
-              <a:schemeClr val="accent1"/>
-            </a:effectRef>
-            <a:fontRef idx="minor">
-              <a:schemeClr val="lt1"/>
-            </a:fontRef>
-          </p:style>
-          <p:txBody>
-            <a:bodyPr rtlCol="0" anchor="ctr"/>
-            <a:lstStyle/>
-            <a:p>
-              <a:pPr algn="ctr"/>
-              <a:endParaRPr lang="en-US"/>
-            </a:p>
-          </p:txBody>
-        </p:sp>
-        <p:sp>
-          <p:nvSpPr>
-            <p:cNvPr id="15" name="Oval 14"/>
-            <p:cNvSpPr>
-              <a:spLocks/>
-            </p:cNvSpPr>
-            <p:nvPr/>
-          </p:nvSpPr>
-          <p:spPr>
-            <a:xfrm>
-              <a:off x="3108960" y="1463040"/>
-              <a:ext cx="91440" cy="91440"/>
-            </a:xfrm>
-            <a:prstGeom prst="ellipse">
-              <a:avLst/>
-            </a:prstGeom>
-            <a:solidFill>
-              <a:schemeClr val="tx1"/>
-            </a:solidFill>
-          </p:spPr>
-          <p:style>
-            <a:lnRef idx="2">
-              <a:schemeClr val="accent1">
-                <a:shade val="50000"/>
-              </a:schemeClr>
-            </a:lnRef>
-            <a:fillRef idx="1">
-              <a:schemeClr val="accent1"/>
-            </a:fillRef>
-            <a:effectRef idx="0">
-              <a:schemeClr val="accent1"/>
-            </a:effectRef>
-            <a:fontRef idx="minor">
-              <a:schemeClr val="lt1"/>
-            </a:fontRef>
-          </p:style>
-          <p:txBody>
-            <a:bodyPr rtlCol="0" anchor="ctr"/>
-            <a:lstStyle/>
-            <a:p>
-              <a:pPr algn="ctr"/>
-              <a:endParaRPr lang="en-US"/>
-            </a:p>
-          </p:txBody>
-        </p:sp>
-        <p:sp>
-          <p:nvSpPr>
-            <p:cNvPr id="16" name="Oval 15"/>
-            <p:cNvSpPr>
-              <a:spLocks/>
-            </p:cNvSpPr>
-            <p:nvPr/>
-          </p:nvSpPr>
-          <p:spPr>
-            <a:xfrm>
-              <a:off x="3657600" y="1463040"/>
-              <a:ext cx="91440" cy="91440"/>
-            </a:xfrm>
-            <a:prstGeom prst="ellipse">
-              <a:avLst/>
-            </a:prstGeom>
-            <a:solidFill>
-              <a:schemeClr val="tx1"/>
-            </a:solidFill>
-          </p:spPr>
-          <p:style>
-            <a:lnRef idx="2">
-              <a:schemeClr val="accent1">
-                <a:shade val="50000"/>
-              </a:schemeClr>
-            </a:lnRef>
-            <a:fillRef idx="1">
-              <a:schemeClr val="accent1"/>
-            </a:fillRef>
-            <a:effectRef idx="0">
-              <a:schemeClr val="accent1"/>
-            </a:effectRef>
-            <a:fontRef idx="minor">
-              <a:schemeClr val="lt1"/>
-            </a:fontRef>
-          </p:style>
-          <p:txBody>
-            <a:bodyPr rtlCol="0" anchor="ctr"/>
-            <a:lstStyle/>
-            <a:p>
-              <a:pPr algn="ctr"/>
-              <a:endParaRPr lang="en-US"/>
-            </a:p>
-          </p:txBody>
-        </p:sp>
-        <p:sp>
-          <p:nvSpPr>
-            <p:cNvPr id="17" name="Oval 16"/>
-            <p:cNvSpPr>
-              <a:spLocks/>
-            </p:cNvSpPr>
-            <p:nvPr/>
-          </p:nvSpPr>
-          <p:spPr>
-            <a:xfrm>
-              <a:off x="914400" y="2011680"/>
-              <a:ext cx="91440" cy="91440"/>
-            </a:xfrm>
-            <a:prstGeom prst="ellipse">
-              <a:avLst/>
-            </a:prstGeom>
-            <a:solidFill>
-              <a:schemeClr val="tx1"/>
-            </a:solidFill>
-          </p:spPr>
-          <p:style>
-            <a:lnRef idx="2">
-              <a:schemeClr val="accent1">
-                <a:shade val="50000"/>
-              </a:schemeClr>
-            </a:lnRef>
-            <a:fillRef idx="1">
-              <a:schemeClr val="accent1"/>
-            </a:fillRef>
-            <a:effectRef idx="0">
-              <a:schemeClr val="accent1"/>
-            </a:effectRef>
-            <a:fontRef idx="minor">
-              <a:schemeClr val="lt1"/>
-            </a:fontRef>
-          </p:style>
-          <p:txBody>
-            <a:bodyPr rtlCol="0" anchor="ctr"/>
-            <a:lstStyle/>
-            <a:p>
-              <a:pPr algn="ctr"/>
-              <a:endParaRPr lang="en-US"/>
-            </a:p>
-          </p:txBody>
-        </p:sp>
-        <p:sp>
-          <p:nvSpPr>
-            <p:cNvPr id="18" name="Oval 17"/>
-            <p:cNvSpPr>
-              <a:spLocks/>
-            </p:cNvSpPr>
-            <p:nvPr/>
-          </p:nvSpPr>
-          <p:spPr>
-            <a:xfrm>
-              <a:off x="1463040" y="2011680"/>
-              <a:ext cx="91440" cy="91440"/>
-            </a:xfrm>
-            <a:prstGeom prst="ellipse">
-              <a:avLst/>
-            </a:prstGeom>
-            <a:solidFill>
-              <a:schemeClr val="tx1"/>
-            </a:solidFill>
-          </p:spPr>
-          <p:style>
-            <a:lnRef idx="2">
-              <a:schemeClr val="accent1">
-                <a:shade val="50000"/>
-              </a:schemeClr>
-            </a:lnRef>
-            <a:fillRef idx="1">
-              <a:schemeClr val="accent1"/>
-            </a:fillRef>
-            <a:effectRef idx="0">
-              <a:schemeClr val="accent1"/>
-            </a:effectRef>
-            <a:fontRef idx="minor">
-              <a:schemeClr val="lt1"/>
-            </a:fontRef>
-          </p:style>
-          <p:txBody>
-            <a:bodyPr rtlCol="0" anchor="ctr"/>
-            <a:lstStyle/>
-            <a:p>
-              <a:pPr algn="ctr"/>
-              <a:endParaRPr lang="en-US"/>
-            </a:p>
-          </p:txBody>
-        </p:sp>
-        <p:sp>
-          <p:nvSpPr>
-            <p:cNvPr id="19" name="Oval 18"/>
-            <p:cNvSpPr>
-              <a:spLocks/>
-            </p:cNvSpPr>
-            <p:nvPr/>
-          </p:nvSpPr>
-          <p:spPr>
-            <a:xfrm>
-              <a:off x="2011680" y="2011680"/>
-              <a:ext cx="91440" cy="91440"/>
-            </a:xfrm>
-            <a:prstGeom prst="ellipse">
-              <a:avLst/>
-            </a:prstGeom>
-            <a:solidFill>
-              <a:schemeClr val="tx1"/>
-            </a:solidFill>
-          </p:spPr>
-          <p:style>
-            <a:lnRef idx="2">
-              <a:schemeClr val="accent1">
-                <a:shade val="50000"/>
-              </a:schemeClr>
-            </a:lnRef>
-            <a:fillRef idx="1">
-              <a:schemeClr val="accent1"/>
-            </a:fillRef>
-            <a:effectRef idx="0">
-              <a:schemeClr val="accent1"/>
-            </a:effectRef>
-            <a:fontRef idx="minor">
-              <a:schemeClr val="lt1"/>
-            </a:fontRef>
-          </p:style>
-          <p:txBody>
-            <a:bodyPr rtlCol="0" anchor="ctr"/>
-            <a:lstStyle/>
-            <a:p>
-              <a:pPr algn="ctr"/>
-              <a:endParaRPr lang="en-US"/>
-            </a:p>
-          </p:txBody>
-        </p:sp>
-        <p:sp>
-          <p:nvSpPr>
-            <p:cNvPr id="20" name="Oval 19"/>
-            <p:cNvSpPr>
-              <a:spLocks/>
-            </p:cNvSpPr>
-            <p:nvPr/>
-          </p:nvSpPr>
-          <p:spPr>
-            <a:xfrm>
-              <a:off x="2560320" y="2011680"/>
-              <a:ext cx="91440" cy="91440"/>
-            </a:xfrm>
-            <a:prstGeom prst="ellipse">
-              <a:avLst/>
-            </a:prstGeom>
-            <a:solidFill>
-              <a:schemeClr val="tx1"/>
-            </a:solidFill>
-          </p:spPr>
-          <p:style>
-            <a:lnRef idx="2">
-              <a:schemeClr val="accent1">
-                <a:shade val="50000"/>
-              </a:schemeClr>
-            </a:lnRef>
-            <a:fillRef idx="1">
-              <a:schemeClr val="accent1"/>
-            </a:fillRef>
-            <a:effectRef idx="0">
-              <a:schemeClr val="accent1"/>
-            </a:effectRef>
-            <a:fontRef idx="minor">
-              <a:schemeClr val="lt1"/>
-            </a:fontRef>
-          </p:style>
-          <p:txBody>
-            <a:bodyPr rtlCol="0" anchor="ctr"/>
-            <a:lstStyle/>
-            <a:p>
-              <a:pPr algn="ctr"/>
-              <a:endParaRPr lang="en-US"/>
-            </a:p>
-          </p:txBody>
-        </p:sp>
-        <p:sp>
-          <p:nvSpPr>
-            <p:cNvPr id="21" name="Oval 20"/>
-            <p:cNvSpPr>
-              <a:spLocks/>
-            </p:cNvSpPr>
-            <p:nvPr/>
-          </p:nvSpPr>
-          <p:spPr>
-            <a:xfrm>
-              <a:off x="3108960" y="2011680"/>
-              <a:ext cx="91440" cy="91440"/>
-            </a:xfrm>
-            <a:prstGeom prst="ellipse">
-              <a:avLst/>
-            </a:prstGeom>
-            <a:solidFill>
-              <a:schemeClr val="tx1"/>
-            </a:solidFill>
-          </p:spPr>
-          <p:style>
-            <a:lnRef idx="2">
-              <a:schemeClr val="accent1">
-                <a:shade val="50000"/>
-              </a:schemeClr>
-            </a:lnRef>
-            <a:fillRef idx="1">
-              <a:schemeClr val="accent1"/>
-            </a:fillRef>
-            <a:effectRef idx="0">
-              <a:schemeClr val="accent1"/>
-            </a:effectRef>
-            <a:fontRef idx="minor">
-              <a:schemeClr val="lt1"/>
-            </a:fontRef>
-          </p:style>
-          <p:txBody>
-            <a:bodyPr rtlCol="0" anchor="ctr"/>
-            <a:lstStyle/>
-            <a:p>
-              <a:pPr algn="ctr"/>
-              <a:endParaRPr lang="en-US"/>
-            </a:p>
-          </p:txBody>
-        </p:sp>
-        <p:sp>
-          <p:nvSpPr>
-            <p:cNvPr id="22" name="Oval 21"/>
-            <p:cNvSpPr>
-              <a:spLocks/>
-            </p:cNvSpPr>
-            <p:nvPr/>
-          </p:nvSpPr>
-          <p:spPr>
-            <a:xfrm>
-              <a:off x="3657600" y="2011680"/>
-              <a:ext cx="91440" cy="91440"/>
-            </a:xfrm>
-            <a:prstGeom prst="ellipse">
-              <a:avLst/>
-            </a:prstGeom>
-            <a:solidFill>
-              <a:schemeClr val="tx1"/>
-            </a:solidFill>
-          </p:spPr>
-          <p:style>
-            <a:lnRef idx="2">
-              <a:schemeClr val="accent1">
-                <a:shade val="50000"/>
-              </a:schemeClr>
-            </a:lnRef>
-            <a:fillRef idx="1">
-              <a:schemeClr val="accent1"/>
-            </a:fillRef>
-            <a:effectRef idx="0">
-              <a:schemeClr val="accent1"/>
-            </a:effectRef>
-            <a:fontRef idx="minor">
-              <a:schemeClr val="lt1"/>
-            </a:fontRef>
-          </p:style>
-          <p:txBody>
-            <a:bodyPr rtlCol="0" anchor="ctr"/>
-            <a:lstStyle/>
-            <a:p>
-              <a:pPr algn="ctr"/>
-              <a:endParaRPr lang="en-US"/>
-            </a:p>
-          </p:txBody>
-        </p:sp>
-        <p:sp>
-          <p:nvSpPr>
-            <p:cNvPr id="23" name="Oval 22"/>
-            <p:cNvSpPr>
-              <a:spLocks/>
-            </p:cNvSpPr>
-            <p:nvPr/>
-          </p:nvSpPr>
-          <p:spPr>
-            <a:xfrm>
-              <a:off x="914400" y="2560320"/>
-              <a:ext cx="91440" cy="91440"/>
-            </a:xfrm>
-            <a:prstGeom prst="ellipse">
-              <a:avLst/>
-            </a:prstGeom>
-            <a:solidFill>
-              <a:schemeClr val="tx1"/>
-            </a:solidFill>
-          </p:spPr>
-          <p:style>
-            <a:lnRef idx="2">
-              <a:schemeClr val="accent1">
-                <a:shade val="50000"/>
-              </a:schemeClr>
-            </a:lnRef>
-            <a:fillRef idx="1">
-              <a:schemeClr val="accent1"/>
-            </a:fillRef>
-            <a:effectRef idx="0">
-              <a:schemeClr val="accent1"/>
-            </a:effectRef>
-            <a:fontRef idx="minor">
-              <a:schemeClr val="lt1"/>
-            </a:fontRef>
-          </p:style>
-          <p:txBody>
-            <a:bodyPr rtlCol="0" anchor="ctr"/>
-            <a:lstStyle/>
-            <a:p>
-              <a:pPr algn="ctr"/>
-              <a:endParaRPr lang="en-US"/>
-            </a:p>
-          </p:txBody>
-        </p:sp>
-        <p:sp>
-          <p:nvSpPr>
-            <p:cNvPr id="24" name="Oval 23"/>
-            <p:cNvSpPr>
-              <a:spLocks/>
-            </p:cNvSpPr>
-            <p:nvPr/>
-          </p:nvSpPr>
-          <p:spPr>
-            <a:xfrm>
-              <a:off x="1463040" y="2560320"/>
-              <a:ext cx="91440" cy="91440"/>
-            </a:xfrm>
-            <a:prstGeom prst="ellipse">
-              <a:avLst/>
-            </a:prstGeom>
-            <a:solidFill>
-              <a:schemeClr val="tx1"/>
-            </a:solidFill>
-          </p:spPr>
-          <p:style>
-            <a:lnRef idx="2">
-              <a:schemeClr val="accent1">
-                <a:shade val="50000"/>
-              </a:schemeClr>
-            </a:lnRef>
-            <a:fillRef idx="1">
-              <a:schemeClr val="accent1"/>
-            </a:fillRef>
-            <a:effectRef idx="0">
-              <a:schemeClr val="accent1"/>
-            </a:effectRef>
-            <a:fontRef idx="minor">
-              <a:schemeClr val="lt1"/>
-            </a:fontRef>
-          </p:style>
-          <p:txBody>
-            <a:bodyPr rtlCol="0" anchor="ctr"/>
-            <a:lstStyle/>
-            <a:p>
-              <a:pPr algn="ctr"/>
-              <a:endParaRPr lang="en-US"/>
-            </a:p>
-          </p:txBody>
-        </p:sp>
-        <p:sp>
-          <p:nvSpPr>
-            <p:cNvPr id="25" name="Oval 24"/>
-            <p:cNvSpPr>
-              <a:spLocks/>
-            </p:cNvSpPr>
-            <p:nvPr/>
-          </p:nvSpPr>
-          <p:spPr>
-            <a:xfrm>
-              <a:off x="2011680" y="2560320"/>
-              <a:ext cx="91440" cy="91440"/>
-            </a:xfrm>
-            <a:prstGeom prst="ellipse">
-              <a:avLst/>
-            </a:prstGeom>
-            <a:solidFill>
-              <a:schemeClr val="tx1"/>
-            </a:solidFill>
-          </p:spPr>
-          <p:style>
-            <a:lnRef idx="2">
-              <a:schemeClr val="accent1">
-                <a:shade val="50000"/>
-              </a:schemeClr>
-            </a:lnRef>
-            <a:fillRef idx="1">
-              <a:schemeClr val="accent1"/>
-            </a:fillRef>
-            <a:effectRef idx="0">
-              <a:schemeClr val="accent1"/>
-            </a:effectRef>
-            <a:fontRef idx="minor">
-              <a:schemeClr val="lt1"/>
-            </a:fontRef>
-          </p:style>
-          <p:txBody>
-            <a:bodyPr rtlCol="0" anchor="ctr"/>
-            <a:lstStyle/>
-            <a:p>
-              <a:pPr algn="ctr"/>
-              <a:endParaRPr lang="en-US"/>
-            </a:p>
-          </p:txBody>
-        </p:sp>
-        <p:sp>
-          <p:nvSpPr>
-            <p:cNvPr id="26" name="Oval 25"/>
-            <p:cNvSpPr>
-              <a:spLocks/>
-            </p:cNvSpPr>
-            <p:nvPr/>
-          </p:nvSpPr>
-          <p:spPr>
-            <a:xfrm>
-              <a:off x="2560320" y="2560320"/>
-              <a:ext cx="91440" cy="91440"/>
-            </a:xfrm>
-            <a:prstGeom prst="ellipse">
-              <a:avLst/>
-            </a:prstGeom>
-            <a:solidFill>
-              <a:schemeClr val="tx1"/>
-            </a:solidFill>
-          </p:spPr>
-          <p:style>
-            <a:lnRef idx="2">
-              <a:schemeClr val="accent1">
-                <a:shade val="50000"/>
-              </a:schemeClr>
-            </a:lnRef>
-            <a:fillRef idx="1">
-              <a:schemeClr val="accent1"/>
-            </a:fillRef>
-            <a:effectRef idx="0">
-              <a:schemeClr val="accent1"/>
-            </a:effectRef>
-            <a:fontRef idx="minor">
-              <a:schemeClr val="lt1"/>
-            </a:fontRef>
-          </p:style>
-          <p:txBody>
-            <a:bodyPr rtlCol="0" anchor="ctr"/>
-            <a:lstStyle/>
-            <a:p>
-              <a:pPr algn="ctr"/>
-              <a:endParaRPr lang="en-US"/>
-            </a:p>
-          </p:txBody>
-        </p:sp>
-        <p:sp>
-          <p:nvSpPr>
-            <p:cNvPr id="27" name="Oval 26"/>
-            <p:cNvSpPr>
-              <a:spLocks/>
-            </p:cNvSpPr>
-            <p:nvPr/>
-          </p:nvSpPr>
-          <p:spPr>
-            <a:xfrm>
-              <a:off x="3108960" y="2560320"/>
-              <a:ext cx="91440" cy="91440"/>
-            </a:xfrm>
-            <a:prstGeom prst="ellipse">
-              <a:avLst/>
-            </a:prstGeom>
-            <a:solidFill>
-              <a:schemeClr val="tx1"/>
-            </a:solidFill>
-          </p:spPr>
-          <p:style>
-            <a:lnRef idx="2">
-              <a:schemeClr val="accent1">
-                <a:shade val="50000"/>
-              </a:schemeClr>
-            </a:lnRef>
-            <a:fillRef idx="1">
-              <a:schemeClr val="accent1"/>
-            </a:fillRef>
-            <a:effectRef idx="0">
-              <a:schemeClr val="accent1"/>
-            </a:effectRef>
-            <a:fontRef idx="minor">
-              <a:schemeClr val="lt1"/>
-            </a:fontRef>
-          </p:style>
-          <p:txBody>
-            <a:bodyPr rtlCol="0" anchor="ctr"/>
-            <a:lstStyle/>
-            <a:p>
-              <a:pPr algn="ctr"/>
-              <a:endParaRPr lang="en-US"/>
-            </a:p>
-          </p:txBody>
-        </p:sp>
-        <p:sp>
-          <p:nvSpPr>
-            <p:cNvPr id="28" name="Oval 27"/>
-            <p:cNvSpPr>
-              <a:spLocks/>
-            </p:cNvSpPr>
-            <p:nvPr/>
-          </p:nvSpPr>
-          <p:spPr>
-            <a:xfrm>
-              <a:off x="3657600" y="2560320"/>
-              <a:ext cx="91440" cy="91440"/>
-            </a:xfrm>
-            <a:prstGeom prst="ellipse">
-              <a:avLst/>
-            </a:prstGeom>
-            <a:solidFill>
-              <a:schemeClr val="tx1"/>
-            </a:solidFill>
-          </p:spPr>
-          <p:style>
-            <a:lnRef idx="2">
-              <a:schemeClr val="accent1">
-                <a:shade val="50000"/>
-              </a:schemeClr>
-            </a:lnRef>
-            <a:fillRef idx="1">
-              <a:schemeClr val="accent1"/>
-            </a:fillRef>
-            <a:effectRef idx="0">
-              <a:schemeClr val="accent1"/>
-            </a:effectRef>
-            <a:fontRef idx="minor">
-              <a:schemeClr val="lt1"/>
-            </a:fontRef>
-          </p:style>
-          <p:txBody>
-            <a:bodyPr rtlCol="0" anchor="ctr"/>
-            <a:lstStyle/>
-            <a:p>
-              <a:pPr algn="ctr"/>
-              <a:endParaRPr lang="en-US"/>
-            </a:p>
-          </p:txBody>
-        </p:sp>
-        <p:sp>
-          <p:nvSpPr>
-            <p:cNvPr id="29" name="Oval 28"/>
-            <p:cNvSpPr>
-              <a:spLocks/>
-            </p:cNvSpPr>
-            <p:nvPr/>
-          </p:nvSpPr>
-          <p:spPr>
-            <a:xfrm>
-              <a:off x="914400" y="3108960"/>
-              <a:ext cx="91440" cy="91440"/>
-            </a:xfrm>
-            <a:prstGeom prst="ellipse">
-              <a:avLst/>
-            </a:prstGeom>
-            <a:solidFill>
-              <a:schemeClr val="tx1"/>
-            </a:solidFill>
-          </p:spPr>
-          <p:style>
-            <a:lnRef idx="2">
-              <a:schemeClr val="accent1">
-                <a:shade val="50000"/>
-              </a:schemeClr>
-            </a:lnRef>
-            <a:fillRef idx="1">
-              <a:schemeClr val="accent1"/>
-            </a:fillRef>
-            <a:effectRef idx="0">
-              <a:schemeClr val="accent1"/>
-            </a:effectRef>
-            <a:fontRef idx="minor">
-              <a:schemeClr val="lt1"/>
-            </a:fontRef>
-          </p:style>
-          <p:txBody>
-            <a:bodyPr rtlCol="0" anchor="ctr"/>
-            <a:lstStyle/>
-            <a:p>
-              <a:pPr algn="ctr"/>
-              <a:endParaRPr lang="en-US"/>
-            </a:p>
-          </p:txBody>
-        </p:sp>
-        <p:sp>
-          <p:nvSpPr>
-            <p:cNvPr id="30" name="Oval 29"/>
-            <p:cNvSpPr>
-              <a:spLocks/>
-            </p:cNvSpPr>
-            <p:nvPr/>
-          </p:nvSpPr>
-          <p:spPr>
-            <a:xfrm>
-              <a:off x="1463040" y="3108960"/>
-              <a:ext cx="91440" cy="91440"/>
-            </a:xfrm>
-            <a:prstGeom prst="ellipse">
-              <a:avLst/>
-            </a:prstGeom>
-            <a:solidFill>
-              <a:schemeClr val="tx1"/>
-            </a:solidFill>
-          </p:spPr>
-          <p:style>
-            <a:lnRef idx="2">
-              <a:schemeClr val="accent1">
-                <a:shade val="50000"/>
-              </a:schemeClr>
-            </a:lnRef>
-            <a:fillRef idx="1">
-              <a:schemeClr val="accent1"/>
-            </a:fillRef>
-            <a:effectRef idx="0">
-              <a:schemeClr val="accent1"/>
-            </a:effectRef>
-            <a:fontRef idx="minor">
-              <a:schemeClr val="lt1"/>
-            </a:fontRef>
-          </p:style>
-          <p:txBody>
-            <a:bodyPr rtlCol="0" anchor="ctr"/>
-            <a:lstStyle/>
-            <a:p>
-              <a:pPr algn="ctr"/>
-              <a:endParaRPr lang="en-US"/>
-            </a:p>
-          </p:txBody>
-        </p:sp>
-        <p:sp>
-          <p:nvSpPr>
-            <p:cNvPr id="31" name="Oval 30"/>
-            <p:cNvSpPr>
-              <a:spLocks/>
-            </p:cNvSpPr>
-            <p:nvPr/>
-          </p:nvSpPr>
-          <p:spPr>
-            <a:xfrm>
-              <a:off x="2011680" y="3108960"/>
-              <a:ext cx="91440" cy="91440"/>
-            </a:xfrm>
-            <a:prstGeom prst="ellipse">
-              <a:avLst/>
-            </a:prstGeom>
-            <a:solidFill>
-              <a:schemeClr val="tx1"/>
-            </a:solidFill>
-          </p:spPr>
-          <p:style>
-            <a:lnRef idx="2">
-              <a:schemeClr val="accent1">
-                <a:shade val="50000"/>
-              </a:schemeClr>
-            </a:lnRef>
-            <a:fillRef idx="1">
-              <a:schemeClr val="accent1"/>
-            </a:fillRef>
-            <a:effectRef idx="0">
-              <a:schemeClr val="accent1"/>
-            </a:effectRef>
-            <a:fontRef idx="minor">
-              <a:schemeClr val="lt1"/>
-            </a:fontRef>
-          </p:style>
-          <p:txBody>
-            <a:bodyPr rtlCol="0" anchor="ctr"/>
-            <a:lstStyle/>
-            <a:p>
-              <a:pPr algn="ctr"/>
-              <a:endParaRPr lang="en-US"/>
-            </a:p>
-          </p:txBody>
-        </p:sp>
-        <p:sp>
-          <p:nvSpPr>
-            <p:cNvPr id="32" name="Oval 31"/>
-            <p:cNvSpPr>
-              <a:spLocks/>
-            </p:cNvSpPr>
-            <p:nvPr/>
-          </p:nvSpPr>
-          <p:spPr>
-            <a:xfrm>
-              <a:off x="2560320" y="3108960"/>
-              <a:ext cx="91440" cy="91440"/>
-            </a:xfrm>
-            <a:prstGeom prst="ellipse">
-              <a:avLst/>
-            </a:prstGeom>
-            <a:solidFill>
-              <a:schemeClr val="tx1"/>
-            </a:solidFill>
-          </p:spPr>
-          <p:style>
-            <a:lnRef idx="2">
-              <a:schemeClr val="accent1">
-                <a:shade val="50000"/>
-              </a:schemeClr>
-            </a:lnRef>
-            <a:fillRef idx="1">
-              <a:schemeClr val="accent1"/>
-            </a:fillRef>
-            <a:effectRef idx="0">
-              <a:schemeClr val="accent1"/>
-            </a:effectRef>
-            <a:fontRef idx="minor">
-              <a:schemeClr val="lt1"/>
-            </a:fontRef>
-          </p:style>
-          <p:txBody>
-            <a:bodyPr rtlCol="0" anchor="ctr"/>
-            <a:lstStyle/>
-            <a:p>
-              <a:pPr algn="ctr"/>
-              <a:endParaRPr lang="en-US"/>
-            </a:p>
-          </p:txBody>
-        </p:sp>
-        <p:sp>
-          <p:nvSpPr>
-            <p:cNvPr id="33" name="Oval 32"/>
-            <p:cNvSpPr>
-              <a:spLocks/>
-            </p:cNvSpPr>
-            <p:nvPr/>
-          </p:nvSpPr>
-          <p:spPr>
-            <a:xfrm>
-              <a:off x="3108960" y="3108960"/>
-              <a:ext cx="91440" cy="91440"/>
-            </a:xfrm>
-            <a:prstGeom prst="ellipse">
-              <a:avLst/>
-            </a:prstGeom>
-            <a:solidFill>
-              <a:schemeClr val="tx1"/>
-            </a:solidFill>
-          </p:spPr>
-          <p:style>
-            <a:lnRef idx="2">
-              <a:schemeClr val="accent1">
-                <a:shade val="50000"/>
-              </a:schemeClr>
-            </a:lnRef>
-            <a:fillRef idx="1">
-              <a:schemeClr val="accent1"/>
-            </a:fillRef>
-            <a:effectRef idx="0">
-              <a:schemeClr val="accent1"/>
-            </a:effectRef>
-            <a:fontRef idx="minor">
-              <a:schemeClr val="lt1"/>
-            </a:fontRef>
-          </p:style>
-          <p:txBody>
-            <a:bodyPr rtlCol="0" anchor="ctr"/>
-            <a:lstStyle/>
-            <a:p>
-              <a:pPr algn="ctr"/>
-              <a:endParaRPr lang="en-US"/>
-            </a:p>
-          </p:txBody>
-        </p:sp>
-        <p:sp>
-          <p:nvSpPr>
-            <p:cNvPr id="34" name="Oval 33"/>
-            <p:cNvSpPr>
-              <a:spLocks/>
-            </p:cNvSpPr>
-            <p:nvPr/>
-          </p:nvSpPr>
-          <p:spPr>
-            <a:xfrm>
-              <a:off x="3657600" y="3108960"/>
-              <a:ext cx="91440" cy="91440"/>
-            </a:xfrm>
-            <a:prstGeom prst="ellipse">
-              <a:avLst/>
-            </a:prstGeom>
-            <a:solidFill>
-              <a:schemeClr val="tx1"/>
-            </a:solidFill>
-          </p:spPr>
-          <p:style>
-            <a:lnRef idx="2">
-              <a:schemeClr val="accent1">
-                <a:shade val="50000"/>
-              </a:schemeClr>
-            </a:lnRef>
-            <a:fillRef idx="1">
-              <a:schemeClr val="accent1"/>
-            </a:fillRef>
-            <a:effectRef idx="0">
-              <a:schemeClr val="accent1"/>
-            </a:effectRef>
-            <a:fontRef idx="minor">
-              <a:schemeClr val="lt1"/>
-            </a:fontRef>
-          </p:style>
-          <p:txBody>
-            <a:bodyPr rtlCol="0" anchor="ctr"/>
-            <a:lstStyle/>
-            <a:p>
-              <a:pPr algn="ctr"/>
-              <a:endParaRPr lang="en-US"/>
-            </a:p>
-          </p:txBody>
-        </p:sp>
-        <p:sp>
-          <p:nvSpPr>
-            <p:cNvPr id="35" name="Oval 34"/>
-            <p:cNvSpPr>
-              <a:spLocks/>
-            </p:cNvSpPr>
-            <p:nvPr/>
-          </p:nvSpPr>
-          <p:spPr>
-            <a:xfrm>
-              <a:off x="914400" y="3657600"/>
-              <a:ext cx="91440" cy="91440"/>
-            </a:xfrm>
-            <a:prstGeom prst="ellipse">
-              <a:avLst/>
-            </a:prstGeom>
-            <a:solidFill>
-              <a:schemeClr val="tx1"/>
-            </a:solidFill>
-          </p:spPr>
-          <p:style>
-            <a:lnRef idx="2">
-              <a:schemeClr val="accent1">
-                <a:shade val="50000"/>
-              </a:schemeClr>
-            </a:lnRef>
-            <a:fillRef idx="1">
-              <a:schemeClr val="accent1"/>
-            </a:fillRef>
-            <a:effectRef idx="0">
-              <a:schemeClr val="accent1"/>
-            </a:effectRef>
-            <a:fontRef idx="minor">
-              <a:schemeClr val="lt1"/>
-            </a:fontRef>
-          </p:style>
-          <p:txBody>
-            <a:bodyPr rtlCol="0" anchor="ctr"/>
-            <a:lstStyle/>
-            <a:p>
-              <a:pPr algn="ctr"/>
-              <a:endParaRPr lang="en-US"/>
-            </a:p>
-          </p:txBody>
-        </p:sp>
-        <p:sp>
-          <p:nvSpPr>
-            <p:cNvPr id="36" name="Oval 35"/>
-            <p:cNvSpPr>
-              <a:spLocks/>
-            </p:cNvSpPr>
-            <p:nvPr/>
-          </p:nvSpPr>
-          <p:spPr>
-            <a:xfrm>
-              <a:off x="1463040" y="3657600"/>
-              <a:ext cx="91440" cy="91440"/>
-            </a:xfrm>
-            <a:prstGeom prst="ellipse">
-              <a:avLst/>
-            </a:prstGeom>
-            <a:solidFill>
-              <a:schemeClr val="tx1"/>
-            </a:solidFill>
-          </p:spPr>
-          <p:style>
-            <a:lnRef idx="2">
-              <a:schemeClr val="accent1">
-                <a:shade val="50000"/>
-              </a:schemeClr>
-            </a:lnRef>
-            <a:fillRef idx="1">
-              <a:schemeClr val="accent1"/>
-            </a:fillRef>
-            <a:effectRef idx="0">
-              <a:schemeClr val="accent1"/>
-            </a:effectRef>
-            <a:fontRef idx="minor">
-              <a:schemeClr val="lt1"/>
-            </a:fontRef>
-          </p:style>
-          <p:txBody>
-            <a:bodyPr rtlCol="0" anchor="ctr"/>
-            <a:lstStyle/>
-            <a:p>
-              <a:pPr algn="ctr"/>
-              <a:endParaRPr lang="en-US"/>
-            </a:p>
-          </p:txBody>
-        </p:sp>
-        <p:sp>
-          <p:nvSpPr>
-            <p:cNvPr id="37" name="Oval 36"/>
-            <p:cNvSpPr>
-              <a:spLocks/>
-            </p:cNvSpPr>
-            <p:nvPr/>
-          </p:nvSpPr>
-          <p:spPr>
-            <a:xfrm>
-              <a:off x="2011680" y="3657600"/>
-              <a:ext cx="91440" cy="91440"/>
-            </a:xfrm>
-            <a:prstGeom prst="ellipse">
-              <a:avLst/>
-            </a:prstGeom>
-            <a:solidFill>
-              <a:schemeClr val="tx1"/>
-            </a:solidFill>
-          </p:spPr>
-          <p:style>
-            <a:lnRef idx="2">
-              <a:schemeClr val="accent1">
-                <a:shade val="50000"/>
-              </a:schemeClr>
-            </a:lnRef>
-            <a:fillRef idx="1">
-              <a:schemeClr val="accent1"/>
-            </a:fillRef>
-            <a:effectRef idx="0">
-              <a:schemeClr val="accent1"/>
-            </a:effectRef>
-            <a:fontRef idx="minor">
-              <a:schemeClr val="lt1"/>
-            </a:fontRef>
-          </p:style>
-          <p:txBody>
-            <a:bodyPr rtlCol="0" anchor="ctr"/>
-            <a:lstStyle/>
-            <a:p>
-              <a:pPr algn="ctr"/>
-              <a:endParaRPr lang="en-US"/>
-            </a:p>
-          </p:txBody>
-        </p:sp>
-        <p:sp>
-          <p:nvSpPr>
-            <p:cNvPr id="38" name="Oval 37"/>
-            <p:cNvSpPr>
-              <a:spLocks/>
-            </p:cNvSpPr>
-            <p:nvPr/>
-          </p:nvSpPr>
-          <p:spPr>
-            <a:xfrm>
-              <a:off x="2560320" y="3657600"/>
-              <a:ext cx="91440" cy="91440"/>
-            </a:xfrm>
-            <a:prstGeom prst="ellipse">
-              <a:avLst/>
-            </a:prstGeom>
-            <a:solidFill>
-              <a:schemeClr val="tx1"/>
-            </a:solidFill>
-          </p:spPr>
-          <p:style>
-            <a:lnRef idx="2">
-              <a:schemeClr val="accent1">
-                <a:shade val="50000"/>
-              </a:schemeClr>
-            </a:lnRef>
-            <a:fillRef idx="1">
-              <a:schemeClr val="accent1"/>
-            </a:fillRef>
-            <a:effectRef idx="0">
-              <a:schemeClr val="accent1"/>
-            </a:effectRef>
-            <a:fontRef idx="minor">
-              <a:schemeClr val="lt1"/>
-            </a:fontRef>
-          </p:style>
-          <p:txBody>
-            <a:bodyPr rtlCol="0" anchor="ctr"/>
-            <a:lstStyle/>
-            <a:p>
-              <a:pPr algn="ctr"/>
-              <a:endParaRPr lang="en-US"/>
-            </a:p>
-          </p:txBody>
-        </p:sp>
-        <p:sp>
-          <p:nvSpPr>
-            <p:cNvPr id="39" name="Oval 38"/>
-            <p:cNvSpPr>
-              <a:spLocks/>
-            </p:cNvSpPr>
-            <p:nvPr/>
-          </p:nvSpPr>
-          <p:spPr>
-            <a:xfrm>
-              <a:off x="3108960" y="3657600"/>
-              <a:ext cx="91440" cy="91440"/>
-            </a:xfrm>
-            <a:prstGeom prst="ellipse">
-              <a:avLst/>
-            </a:prstGeom>
-            <a:solidFill>
-              <a:schemeClr val="tx1"/>
-            </a:solidFill>
-          </p:spPr>
-          <p:style>
-            <a:lnRef idx="2">
-              <a:schemeClr val="accent1">
-                <a:shade val="50000"/>
-              </a:schemeClr>
-            </a:lnRef>
-            <a:fillRef idx="1">
-              <a:schemeClr val="accent1"/>
-            </a:fillRef>
-            <a:effectRef idx="0">
-              <a:schemeClr val="accent1"/>
-            </a:effectRef>
-            <a:fontRef idx="minor">
-              <a:schemeClr val="lt1"/>
-            </a:fontRef>
-          </p:style>
-          <p:txBody>
-            <a:bodyPr rtlCol="0" anchor="ctr"/>
-            <a:lstStyle/>
-            <a:p>
-              <a:pPr algn="ctr"/>
-              <a:endParaRPr lang="en-US"/>
-            </a:p>
-          </p:txBody>
-        </p:sp>
-        <p:sp>
-          <p:nvSpPr>
-            <p:cNvPr id="40" name="Oval 39"/>
-            <p:cNvSpPr>
-              <a:spLocks/>
-            </p:cNvSpPr>
-            <p:nvPr/>
-          </p:nvSpPr>
-          <p:spPr>
-            <a:xfrm>
-              <a:off x="3657600" y="3657600"/>
-              <a:ext cx="91440" cy="91440"/>
-            </a:xfrm>
-            <a:prstGeom prst="ellipse">
-              <a:avLst/>
-            </a:prstGeom>
-            <a:solidFill>
-              <a:schemeClr val="tx1"/>
-            </a:solidFill>
-          </p:spPr>
-          <p:style>
-            <a:lnRef idx="2">
-              <a:schemeClr val="accent1">
-                <a:shade val="50000"/>
-              </a:schemeClr>
-            </a:lnRef>
-            <a:fillRef idx="1">
-              <a:schemeClr val="accent1"/>
-            </a:fillRef>
-            <a:effectRef idx="0">
-              <a:schemeClr val="accent1"/>
-            </a:effectRef>
-            <a:fontRef idx="minor">
-              <a:schemeClr val="lt1"/>
-            </a:fontRef>
-          </p:style>
-          <p:txBody>
-            <a:bodyPr rtlCol="0" anchor="ctr"/>
-            <a:lstStyle/>
-            <a:p>
-              <a:pPr algn="ctr"/>
-              <a:endParaRPr lang="en-US"/>
-            </a:p>
-          </p:txBody>
-        </p:sp>
-      </p:grpSp>
       <p:sp>
         <p:nvSpPr>
-          <p:cNvPr id="41" name="TextBox 40"/>
+          <p:cNvPr id="44" name="TextBox 43"/>
           <p:cNvSpPr txBox="1"/>
           <p:nvPr/>
         </p:nvSpPr>
         <p:spPr>
           <a:xfrm>
-            <a:off x="4191000" y="4343400"/>
-            <a:ext cx="1539845" cy="369332"/>
+            <a:off x="6098773" y="1270181"/>
+            <a:ext cx="1978427" cy="369332"/>
           </a:xfrm>
           <a:prstGeom prst="rect">
             <a:avLst/>
@@ -10783,162 +11044,24 @@
           <a:p>
             <a:r>
               <a:rPr lang="en-US" dirty="0" smtClean="0"/>
-              <a:t>View direction</a:t>
+              <a:t>.875 2.625 .75 4.25</a:t>
             </a:r>
             <a:endParaRPr lang="en-US" dirty="0"/>
           </a:p>
         </p:txBody>
       </p:sp>
-      <p:sp>
-        <p:nvSpPr>
-          <p:cNvPr id="42" name="Up Arrow 41"/>
-          <p:cNvSpPr/>
-          <p:nvPr/>
-        </p:nvSpPr>
-        <p:spPr>
-          <a:xfrm rot="19167364">
-            <a:off x="3741038" y="4113242"/>
-            <a:ext cx="304800" cy="838200"/>
-          </a:xfrm>
-          <a:prstGeom prst="upArrow">
-            <a:avLst/>
-          </a:prstGeom>
-        </p:spPr>
-        <p:style>
-          <a:lnRef idx="2">
-            <a:schemeClr val="accent1">
-              <a:shade val="50000"/>
-            </a:schemeClr>
-          </a:lnRef>
-          <a:fillRef idx="1">
-            <a:schemeClr val="accent1"/>
-          </a:fillRef>
-          <a:effectRef idx="0">
-            <a:schemeClr val="accent1"/>
-          </a:effectRef>
-          <a:fontRef idx="minor">
-            <a:schemeClr val="lt1"/>
-          </a:fontRef>
-        </p:style>
-        <p:txBody>
-          <a:bodyPr rtlCol="0" anchor="ctr"/>
-          <a:lstStyle/>
-          <a:p>
-            <a:pPr algn="ctr"/>
-            <a:endParaRPr lang="en-US"/>
-          </a:p>
-        </p:txBody>
-      </p:sp>
-      <p:cxnSp>
-        <p:nvCxnSpPr>
-          <p:cNvPr id="55" name="Straight Connector 54"/>
-          <p:cNvCxnSpPr/>
-          <p:nvPr/>
-        </p:nvCxnSpPr>
-        <p:spPr>
-          <a:xfrm flipV="1">
-            <a:off x="477982" y="1153391"/>
-            <a:ext cx="3803073" cy="2306783"/>
-          </a:xfrm>
-          <a:prstGeom prst="line">
-            <a:avLst/>
-          </a:prstGeom>
-          <a:ln w="25400">
-            <a:solidFill>
-              <a:schemeClr val="tx1"/>
-            </a:solidFill>
-          </a:ln>
-        </p:spPr>
-        <p:style>
-          <a:lnRef idx="1">
-            <a:schemeClr val="accent1"/>
-          </a:lnRef>
-          <a:fillRef idx="0">
-            <a:schemeClr val="accent1"/>
-          </a:fillRef>
-          <a:effectRef idx="0">
-            <a:schemeClr val="accent1"/>
-          </a:effectRef>
-          <a:fontRef idx="minor">
-            <a:schemeClr val="tx1"/>
-          </a:fontRef>
-        </p:style>
-      </p:cxnSp>
-      <p:cxnSp>
-        <p:nvCxnSpPr>
-          <p:cNvPr id="61" name="Straight Connector 60"/>
-          <p:cNvCxnSpPr/>
-          <p:nvPr/>
-        </p:nvCxnSpPr>
-        <p:spPr>
-          <a:xfrm flipV="1">
-            <a:off x="311727" y="820882"/>
-            <a:ext cx="3771900" cy="2296391"/>
-          </a:xfrm>
-          <a:prstGeom prst="line">
-            <a:avLst/>
-          </a:prstGeom>
-          <a:ln w="25400">
-            <a:solidFill>
-              <a:schemeClr val="tx1"/>
-            </a:solidFill>
-          </a:ln>
-        </p:spPr>
-        <p:style>
-          <a:lnRef idx="1">
-            <a:schemeClr val="accent1"/>
-          </a:lnRef>
-          <a:fillRef idx="0">
-            <a:schemeClr val="accent1"/>
-          </a:fillRef>
-          <a:effectRef idx="0">
-            <a:schemeClr val="accent1"/>
-          </a:effectRef>
-          <a:fontRef idx="minor">
-            <a:schemeClr val="tx1"/>
-          </a:fontRef>
-        </p:style>
-      </p:cxnSp>
-      <p:cxnSp>
-        <p:nvCxnSpPr>
-          <p:cNvPr id="62" name="Straight Connector 61"/>
-          <p:cNvCxnSpPr/>
-          <p:nvPr/>
-        </p:nvCxnSpPr>
-        <p:spPr>
-          <a:xfrm flipV="1">
-            <a:off x="228600" y="415636"/>
-            <a:ext cx="3813464" cy="2272148"/>
-          </a:xfrm>
-          <a:prstGeom prst="line">
-            <a:avLst/>
-          </a:prstGeom>
-          <a:ln w="25400">
-            <a:solidFill>
-              <a:schemeClr val="tx1"/>
-            </a:solidFill>
-          </a:ln>
-        </p:spPr>
-        <p:style>
-          <a:lnRef idx="1">
-            <a:schemeClr val="accent1"/>
-          </a:lnRef>
-          <a:fillRef idx="0">
-            <a:schemeClr val="accent1"/>
-          </a:fillRef>
-          <a:effectRef idx="0">
-            <a:schemeClr val="accent1"/>
-          </a:effectRef>
-          <a:fontRef idx="minor">
-            <a:schemeClr val="tx1"/>
-          </a:fontRef>
-        </p:style>
-      </p:cxnSp>
     </p:spTree>
   </p:cSld>
   <p:clrMapOvr>
     <a:masterClrMapping/>
   </p:clrMapOvr>
+  <p:timing>
+    <p:tnLst>
+      <p:par>
+        <p:cTn id="1" dur="indefinite" restart="never" nodeType="tmRoot"/>
+      </p:par>
+    </p:tnLst>
+  </p:timing>
 </p:sld>
 </file>
 

</xml_diff>